<commit_message>
Update live-lecture 4 C00/D00
</commit_message>
<xml_diff>
--- a/lectures/lecture-04/Lecture-Live C00/Lecture 04 - Lecture.pptx
+++ b/lectures/lecture-04/Lecture-Live C00/Lecture 04 - Lecture.pptx
@@ -5,37 +5,42 @@
     <p:sldMasterId id="2147483660" r:id="rId1"/>
   </p:sldMasterIdLst>
   <p:notesMasterIdLst>
-    <p:notesMasterId r:id="rId8"/>
+    <p:notesMasterId r:id="rId13"/>
   </p:notesMasterIdLst>
   <p:sldIdLst>
     <p:sldId id="256" r:id="rId2"/>
     <p:sldId id="257" r:id="rId3"/>
     <p:sldId id="261" r:id="rId4"/>
-    <p:sldId id="264" r:id="rId5"/>
-    <p:sldId id="262" r:id="rId6"/>
-    <p:sldId id="263" r:id="rId7"/>
+    <p:sldId id="265" r:id="rId5"/>
+    <p:sldId id="266" r:id="rId6"/>
+    <p:sldId id="268" r:id="rId7"/>
+    <p:sldId id="269" r:id="rId8"/>
+    <p:sldId id="267" r:id="rId9"/>
+    <p:sldId id="264" r:id="rId10"/>
+    <p:sldId id="262" r:id="rId11"/>
+    <p:sldId id="263" r:id="rId12"/>
   </p:sldIdLst>
   <p:sldSz cx="9144000" cy="5143500" type="screen16x9"/>
   <p:notesSz cx="6858000" cy="9144000"/>
   <p:embeddedFontLst>
     <p:embeddedFont>
       <p:font typeface="Calibri" panose="020F0502020204030204" pitchFamily="34" charset="0"/>
-      <p:regular r:id="rId9"/>
-      <p:bold r:id="rId10"/>
-      <p:italic r:id="rId11"/>
-      <p:boldItalic r:id="rId12"/>
+      <p:regular r:id="rId14"/>
+      <p:bold r:id="rId15"/>
+      <p:italic r:id="rId16"/>
+      <p:boldItalic r:id="rId17"/>
     </p:embeddedFont>
     <p:embeddedFont>
       <p:font typeface="Calibri Light" panose="020F0302020204030204" pitchFamily="34" charset="0"/>
-      <p:regular r:id="rId13"/>
-      <p:italic r:id="rId14"/>
+      <p:regular r:id="rId18"/>
+      <p:italic r:id="rId19"/>
     </p:embeddedFont>
     <p:embeddedFont>
       <p:font typeface="Consolas" panose="020B0609020204030204" pitchFamily="49" charset="0"/>
-      <p:regular r:id="rId15"/>
-      <p:bold r:id="rId16"/>
-      <p:italic r:id="rId17"/>
-      <p:boldItalic r:id="rId18"/>
+      <p:regular r:id="rId20"/>
+      <p:bold r:id="rId21"/>
+      <p:italic r:id="rId22"/>
+      <p:boldItalic r:id="rId23"/>
     </p:embeddedFont>
   </p:embeddedFontLst>
   <p:defaultTextStyle>
@@ -844,7 +849,7 @@
           <a:p>
             <a:fld id="{3A2BF66F-FEB0-48C1-A8B9-A73F54BB1A08}" type="datetimeFigureOut">
               <a:rPr lang="en-US" smtClean="0"/>
-              <a:t>12/17/2020</a:t>
+              <a:t>1/10/2021</a:t>
             </a:fld>
             <a:endParaRPr lang="en-US"/>
           </a:p>
@@ -1044,7 +1049,7 @@
           <a:p>
             <a:fld id="{3A2BF66F-FEB0-48C1-A8B9-A73F54BB1A08}" type="datetimeFigureOut">
               <a:rPr lang="en-US" smtClean="0"/>
-              <a:t>12/17/2020</a:t>
+              <a:t>1/10/2021</a:t>
             </a:fld>
             <a:endParaRPr lang="en-US"/>
           </a:p>
@@ -1254,7 +1259,7 @@
           <a:p>
             <a:fld id="{3A2BF66F-FEB0-48C1-A8B9-A73F54BB1A08}" type="datetimeFigureOut">
               <a:rPr lang="en-US" smtClean="0"/>
-              <a:t>12/17/2020</a:t>
+              <a:t>1/10/2021</a:t>
             </a:fld>
             <a:endParaRPr lang="en-US"/>
           </a:p>
@@ -1454,7 +1459,7 @@
           <a:p>
             <a:fld id="{3A2BF66F-FEB0-48C1-A8B9-A73F54BB1A08}" type="datetimeFigureOut">
               <a:rPr lang="en-US" smtClean="0"/>
-              <a:t>12/17/2020</a:t>
+              <a:t>1/10/2021</a:t>
             </a:fld>
             <a:endParaRPr lang="en-US"/>
           </a:p>
@@ -1731,7 +1736,7 @@
           <a:p>
             <a:fld id="{3A2BF66F-FEB0-48C1-A8B9-A73F54BB1A08}" type="datetimeFigureOut">
               <a:rPr lang="en-US" smtClean="0"/>
-              <a:t>12/17/2020</a:t>
+              <a:t>1/10/2021</a:t>
             </a:fld>
             <a:endParaRPr lang="en-US"/>
           </a:p>
@@ -1998,7 +2003,7 @@
           <a:p>
             <a:fld id="{3A2BF66F-FEB0-48C1-A8B9-A73F54BB1A08}" type="datetimeFigureOut">
               <a:rPr lang="en-US" smtClean="0"/>
-              <a:t>12/17/2020</a:t>
+              <a:t>1/10/2021</a:t>
             </a:fld>
             <a:endParaRPr lang="en-US"/>
           </a:p>
@@ -2412,7 +2417,7 @@
           <a:p>
             <a:fld id="{3A2BF66F-FEB0-48C1-A8B9-A73F54BB1A08}" type="datetimeFigureOut">
               <a:rPr lang="en-US" smtClean="0"/>
-              <a:t>12/17/2020</a:t>
+              <a:t>1/10/2021</a:t>
             </a:fld>
             <a:endParaRPr lang="en-US"/>
           </a:p>
@@ -2555,7 +2560,7 @@
           <a:p>
             <a:fld id="{3A2BF66F-FEB0-48C1-A8B9-A73F54BB1A08}" type="datetimeFigureOut">
               <a:rPr lang="en-US" smtClean="0"/>
-              <a:t>12/17/2020</a:t>
+              <a:t>1/10/2021</a:t>
             </a:fld>
             <a:endParaRPr lang="en-US"/>
           </a:p>
@@ -2670,7 +2675,7 @@
           <a:p>
             <a:fld id="{3A2BF66F-FEB0-48C1-A8B9-A73F54BB1A08}" type="datetimeFigureOut">
               <a:rPr lang="en-US" smtClean="0"/>
-              <a:t>12/17/2020</a:t>
+              <a:t>1/10/2021</a:t>
             </a:fld>
             <a:endParaRPr lang="en-US"/>
           </a:p>
@@ -2982,7 +2987,7 @@
           <a:p>
             <a:fld id="{3A2BF66F-FEB0-48C1-A8B9-A73F54BB1A08}" type="datetimeFigureOut">
               <a:rPr lang="en-US" smtClean="0"/>
-              <a:t>12/17/2020</a:t>
+              <a:t>1/10/2021</a:t>
             </a:fld>
             <a:endParaRPr lang="en-US"/>
           </a:p>
@@ -3272,7 +3277,7 @@
           <a:p>
             <a:fld id="{3A2BF66F-FEB0-48C1-A8B9-A73F54BB1A08}" type="datetimeFigureOut">
               <a:rPr lang="en-US" smtClean="0"/>
-              <a:t>12/17/2020</a:t>
+              <a:t>1/10/2021</a:t>
             </a:fld>
             <a:endParaRPr lang="en-US"/>
           </a:p>
@@ -3515,7 +3520,7 @@
           <a:p>
             <a:fld id="{3A2BF66F-FEB0-48C1-A8B9-A73F54BB1A08}" type="datetimeFigureOut">
               <a:rPr lang="en-US" smtClean="0"/>
-              <a:t>12/17/2020</a:t>
+              <a:t>1/10/2021</a:t>
             </a:fld>
             <a:endParaRPr lang="en-US"/>
           </a:p>
@@ -4063,6 +4068,422 @@
 </p:sld>
 </file>
 
+<file path=ppt/slides/slide10.xml><?xml version="1.0" encoding="utf-8"?>
+<p:sld xmlns:a="http://schemas.openxmlformats.org/drawingml/2006/main" xmlns:r="http://schemas.openxmlformats.org/officeDocument/2006/relationships" xmlns:p="http://schemas.openxmlformats.org/presentationml/2006/main">
+  <p:cSld>
+    <p:spTree>
+      <p:nvGrpSpPr>
+        <p:cNvPr id="1" name=""/>
+        <p:cNvGrpSpPr/>
+        <p:nvPr/>
+      </p:nvGrpSpPr>
+      <p:grpSpPr>
+        <a:xfrm>
+          <a:off x="0" y="0"/>
+          <a:ext cx="0" cy="0"/>
+          <a:chOff x="0" y="0"/>
+          <a:chExt cx="0" cy="0"/>
+        </a:xfrm>
+      </p:grpSpPr>
+      <p:sp>
+        <p:nvSpPr>
+          <p:cNvPr id="2" name="Title 1">
+            <a:extLst>
+              <a:ext uri="{FF2B5EF4-FFF2-40B4-BE49-F238E27FC236}">
+                <a16:creationId xmlns:a16="http://schemas.microsoft.com/office/drawing/2014/main" id="{D22F19BB-D2D4-4322-957A-C89126D13059}"/>
+              </a:ext>
+            </a:extLst>
+          </p:cNvPr>
+          <p:cNvSpPr>
+            <a:spLocks noGrp="1"/>
+          </p:cNvSpPr>
+          <p:nvPr>
+            <p:ph type="title"/>
+          </p:nvPr>
+        </p:nvSpPr>
+        <p:spPr/>
+        <p:txBody>
+          <a:bodyPr/>
+          <a:lstStyle/>
+          <a:p>
+            <a:r>
+              <a:rPr lang="en-US" dirty="0" err="1"/>
+              <a:t>ArrayList</a:t>
+            </a:r>
+            <a:r>
+              <a:rPr lang="en-US" dirty="0"/>
+              <a:t> Insert</a:t>
+            </a:r>
+          </a:p>
+        </p:txBody>
+      </p:sp>
+      <p:sp>
+        <p:nvSpPr>
+          <p:cNvPr id="3" name="Content Placeholder 2">
+            <a:extLst>
+              <a:ext uri="{FF2B5EF4-FFF2-40B4-BE49-F238E27FC236}">
+                <a16:creationId xmlns:a16="http://schemas.microsoft.com/office/drawing/2014/main" id="{0B7C949A-8ABD-489D-9873-B9F0A823A2C7}"/>
+              </a:ext>
+            </a:extLst>
+          </p:cNvPr>
+          <p:cNvSpPr>
+            <a:spLocks noGrp="1"/>
+          </p:cNvSpPr>
+          <p:nvPr>
+            <p:ph idx="1"/>
+          </p:nvPr>
+        </p:nvSpPr>
+        <p:spPr/>
+        <p:txBody>
+          <a:bodyPr/>
+          <a:lstStyle/>
+          <a:p>
+            <a:pPr marL="0" indent="0" algn="l">
+              <a:buNone/>
+            </a:pPr>
+            <a:r>
+              <a:rPr lang="en-US" sz="2400" dirty="0">
+                <a:solidFill>
+                  <a:srgbClr val="3F7F5F"/>
+                </a:solidFill>
+                <a:latin typeface="Consolas" panose="020B0609020204030204" pitchFamily="49" charset="0"/>
+              </a:rPr>
+              <a:t>/* Add an element at the specified index */</a:t>
+            </a:r>
+          </a:p>
+          <a:p>
+            <a:pPr marL="0" indent="0" algn="l">
+              <a:buNone/>
+            </a:pPr>
+            <a:r>
+              <a:rPr lang="en-US" sz="2400" b="1" dirty="0">
+                <a:solidFill>
+                  <a:srgbClr val="7F0055"/>
+                </a:solidFill>
+                <a:latin typeface="Consolas" panose="020B0609020204030204" pitchFamily="49" charset="0"/>
+              </a:rPr>
+              <a:t>void</a:t>
+            </a:r>
+            <a:r>
+              <a:rPr lang="en-US" sz="2400" b="1" dirty="0">
+                <a:solidFill>
+                  <a:srgbClr val="000000"/>
+                </a:solidFill>
+                <a:latin typeface="Consolas" panose="020B0609020204030204" pitchFamily="49" charset="0"/>
+              </a:rPr>
+              <a:t> insert(</a:t>
+            </a:r>
+            <a:r>
+              <a:rPr lang="en-US" sz="2400" b="1" dirty="0">
+                <a:solidFill>
+                  <a:srgbClr val="7F0055"/>
+                </a:solidFill>
+                <a:latin typeface="Consolas" panose="020B0609020204030204" pitchFamily="49" charset="0"/>
+              </a:rPr>
+              <a:t>int</a:t>
+            </a:r>
+            <a:r>
+              <a:rPr lang="en-US" sz="2400" b="1" dirty="0">
+                <a:solidFill>
+                  <a:srgbClr val="000000"/>
+                </a:solidFill>
+                <a:latin typeface="Consolas" panose="020B0609020204030204" pitchFamily="49" charset="0"/>
+              </a:rPr>
+              <a:t> </a:t>
+            </a:r>
+            <a:r>
+              <a:rPr lang="en-US" sz="2400" b="1" dirty="0">
+                <a:solidFill>
+                  <a:srgbClr val="6A3E3E"/>
+                </a:solidFill>
+                <a:latin typeface="Consolas" panose="020B0609020204030204" pitchFamily="49" charset="0"/>
+              </a:rPr>
+              <a:t>index</a:t>
+            </a:r>
+            <a:r>
+              <a:rPr lang="en-US" sz="2400" b="1" dirty="0">
+                <a:solidFill>
+                  <a:srgbClr val="000000"/>
+                </a:solidFill>
+                <a:latin typeface="Consolas" panose="020B0609020204030204" pitchFamily="49" charset="0"/>
+              </a:rPr>
+              <a:t>, String </a:t>
+            </a:r>
+            <a:r>
+              <a:rPr lang="en-US" sz="2400" b="1" dirty="0">
+                <a:solidFill>
+                  <a:srgbClr val="6A3E3E"/>
+                </a:solidFill>
+                <a:latin typeface="Consolas" panose="020B0609020204030204" pitchFamily="49" charset="0"/>
+              </a:rPr>
+              <a:t>s</a:t>
+            </a:r>
+            <a:r>
+              <a:rPr lang="en-US" sz="2400" b="1" dirty="0">
+                <a:solidFill>
+                  <a:srgbClr val="000000"/>
+                </a:solidFill>
+                <a:latin typeface="Consolas" panose="020B0609020204030204" pitchFamily="49" charset="0"/>
+              </a:rPr>
+              <a:t>);</a:t>
+            </a:r>
+          </a:p>
+          <a:p>
+            <a:pPr marL="0" indent="0" algn="l">
+              <a:buNone/>
+            </a:pPr>
+            <a:endParaRPr lang="en-US" sz="2400" b="1" dirty="0">
+              <a:solidFill>
+                <a:srgbClr val="000000"/>
+              </a:solidFill>
+              <a:latin typeface="Consolas" panose="020B0609020204030204" pitchFamily="49" charset="0"/>
+            </a:endParaRPr>
+          </a:p>
+          <a:p>
+            <a:r>
+              <a:rPr lang="en-US" dirty="0"/>
+              <a:t>Write a test case for the </a:t>
+            </a:r>
+            <a:r>
+              <a:rPr lang="en-US" dirty="0" err="1"/>
+              <a:t>ArrayList</a:t>
+            </a:r>
+            <a:r>
+              <a:rPr lang="en-US" dirty="0"/>
+              <a:t> insert method</a:t>
+            </a:r>
+          </a:p>
+          <a:p>
+            <a:r>
+              <a:rPr lang="en-US" dirty="0"/>
+              <a:t>Implement the </a:t>
+            </a:r>
+            <a:r>
+              <a:rPr lang="en-US" dirty="0" err="1"/>
+              <a:t>ArrayList</a:t>
+            </a:r>
+            <a:r>
+              <a:rPr lang="en-US" dirty="0"/>
+              <a:t> insert method</a:t>
+            </a:r>
+          </a:p>
+        </p:txBody>
+      </p:sp>
+    </p:spTree>
+    <p:extLst>
+      <p:ext uri="{BB962C8B-B14F-4D97-AF65-F5344CB8AC3E}">
+        <p14:creationId xmlns:p14="http://schemas.microsoft.com/office/powerpoint/2010/main" val="2282631962"/>
+      </p:ext>
+    </p:extLst>
+  </p:cSld>
+  <p:clrMapOvr>
+    <a:masterClrMapping/>
+  </p:clrMapOvr>
+</p:sld>
+</file>
+
+<file path=ppt/slides/slide11.xml><?xml version="1.0" encoding="utf-8"?>
+<p:sld xmlns:a="http://schemas.openxmlformats.org/drawingml/2006/main" xmlns:r="http://schemas.openxmlformats.org/officeDocument/2006/relationships" xmlns:p="http://schemas.openxmlformats.org/presentationml/2006/main">
+  <p:cSld>
+    <p:spTree>
+      <p:nvGrpSpPr>
+        <p:cNvPr id="1" name=""/>
+        <p:cNvGrpSpPr/>
+        <p:nvPr/>
+      </p:nvGrpSpPr>
+      <p:grpSpPr>
+        <a:xfrm>
+          <a:off x="0" y="0"/>
+          <a:ext cx="0" cy="0"/>
+          <a:chOff x="0" y="0"/>
+          <a:chExt cx="0" cy="0"/>
+        </a:xfrm>
+      </p:grpSpPr>
+      <p:sp>
+        <p:nvSpPr>
+          <p:cNvPr id="2" name="Title 1">
+            <a:extLst>
+              <a:ext uri="{FF2B5EF4-FFF2-40B4-BE49-F238E27FC236}">
+                <a16:creationId xmlns:a16="http://schemas.microsoft.com/office/drawing/2014/main" id="{D22F19BB-D2D4-4322-957A-C89126D13059}"/>
+              </a:ext>
+            </a:extLst>
+          </p:cNvPr>
+          <p:cNvSpPr>
+            <a:spLocks noGrp="1"/>
+          </p:cNvSpPr>
+          <p:nvPr>
+            <p:ph type="title"/>
+          </p:nvPr>
+        </p:nvSpPr>
+        <p:spPr/>
+        <p:txBody>
+          <a:bodyPr/>
+          <a:lstStyle/>
+          <a:p>
+            <a:r>
+              <a:rPr lang="en-US" dirty="0" err="1"/>
+              <a:t>ArrayList</a:t>
+            </a:r>
+            <a:r>
+              <a:rPr lang="en-US" dirty="0"/>
+              <a:t> Remove</a:t>
+            </a:r>
+          </a:p>
+        </p:txBody>
+      </p:sp>
+      <p:sp>
+        <p:nvSpPr>
+          <p:cNvPr id="3" name="Content Placeholder 2">
+            <a:extLst>
+              <a:ext uri="{FF2B5EF4-FFF2-40B4-BE49-F238E27FC236}">
+                <a16:creationId xmlns:a16="http://schemas.microsoft.com/office/drawing/2014/main" id="{0B7C949A-8ABD-489D-9873-B9F0A823A2C7}"/>
+              </a:ext>
+            </a:extLst>
+          </p:cNvPr>
+          <p:cNvSpPr>
+            <a:spLocks noGrp="1"/>
+          </p:cNvSpPr>
+          <p:nvPr>
+            <p:ph idx="1"/>
+          </p:nvPr>
+        </p:nvSpPr>
+        <p:spPr>
+          <a:xfrm>
+            <a:off x="628651" y="1369219"/>
+            <a:ext cx="8196461" cy="3263504"/>
+          </a:xfrm>
+        </p:spPr>
+        <p:txBody>
+          <a:bodyPr/>
+          <a:lstStyle/>
+          <a:p>
+            <a:pPr marL="0" indent="0" algn="l">
+              <a:buNone/>
+            </a:pPr>
+            <a:r>
+              <a:rPr lang="en-US" sz="2400" dirty="0">
+                <a:solidFill>
+                  <a:srgbClr val="3F7F5F"/>
+                </a:solidFill>
+                <a:latin typeface="Consolas" panose="020B0609020204030204" pitchFamily="49" charset="0"/>
+              </a:rPr>
+              <a:t>/* Remove the element at the specified index */</a:t>
+            </a:r>
+          </a:p>
+          <a:p>
+            <a:pPr marL="0" indent="0" algn="l">
+              <a:buNone/>
+            </a:pPr>
+            <a:r>
+              <a:rPr lang="en-US" sz="2400" b="1" dirty="0">
+                <a:solidFill>
+                  <a:srgbClr val="7F0055"/>
+                </a:solidFill>
+                <a:latin typeface="Consolas" panose="020B0609020204030204" pitchFamily="49" charset="0"/>
+              </a:rPr>
+              <a:t>void</a:t>
+            </a:r>
+            <a:r>
+              <a:rPr lang="en-US" sz="2400" b="1" dirty="0">
+                <a:solidFill>
+                  <a:srgbClr val="000000"/>
+                </a:solidFill>
+                <a:latin typeface="Consolas" panose="020B0609020204030204" pitchFamily="49" charset="0"/>
+              </a:rPr>
+              <a:t> remove(</a:t>
+            </a:r>
+            <a:r>
+              <a:rPr lang="en-US" sz="2400" b="1" dirty="0">
+                <a:solidFill>
+                  <a:srgbClr val="7F0055"/>
+                </a:solidFill>
+                <a:latin typeface="Consolas" panose="020B0609020204030204" pitchFamily="49" charset="0"/>
+              </a:rPr>
+              <a:t>int</a:t>
+            </a:r>
+            <a:r>
+              <a:rPr lang="en-US" sz="2400" b="1" dirty="0">
+                <a:solidFill>
+                  <a:srgbClr val="000000"/>
+                </a:solidFill>
+                <a:latin typeface="Consolas" panose="020B0609020204030204" pitchFamily="49" charset="0"/>
+              </a:rPr>
+              <a:t> </a:t>
+            </a:r>
+            <a:r>
+              <a:rPr lang="en-US" sz="2400" b="1" dirty="0">
+                <a:solidFill>
+                  <a:srgbClr val="6A3E3E"/>
+                </a:solidFill>
+                <a:latin typeface="Consolas" panose="020B0609020204030204" pitchFamily="49" charset="0"/>
+              </a:rPr>
+              <a:t>index</a:t>
+            </a:r>
+            <a:r>
+              <a:rPr lang="en-US" sz="2400" b="1" dirty="0">
+                <a:solidFill>
+                  <a:srgbClr val="000000"/>
+                </a:solidFill>
+                <a:latin typeface="Consolas" panose="020B0609020204030204" pitchFamily="49" charset="0"/>
+              </a:rPr>
+              <a:t>);</a:t>
+            </a:r>
+          </a:p>
+          <a:p>
+            <a:pPr algn="l"/>
+            <a:endParaRPr lang="en-US" sz="2400" b="1" dirty="0">
+              <a:solidFill>
+                <a:srgbClr val="000000"/>
+              </a:solidFill>
+              <a:latin typeface="Consolas" panose="020B0609020204030204" pitchFamily="49" charset="0"/>
+            </a:endParaRPr>
+          </a:p>
+          <a:p>
+            <a:r>
+              <a:rPr lang="en-US" dirty="0"/>
+              <a:t>Write a test case for the </a:t>
+            </a:r>
+            <a:r>
+              <a:rPr lang="en-US" dirty="0" err="1"/>
+              <a:t>ArrayList</a:t>
+            </a:r>
+            <a:r>
+              <a:rPr lang="en-US" dirty="0"/>
+              <a:t> remove method</a:t>
+            </a:r>
+          </a:p>
+          <a:p>
+            <a:r>
+              <a:rPr lang="en-US" dirty="0"/>
+              <a:t>Implement the </a:t>
+            </a:r>
+            <a:r>
+              <a:rPr lang="en-US" dirty="0" err="1"/>
+              <a:t>ArrayList</a:t>
+            </a:r>
+            <a:r>
+              <a:rPr lang="en-US" dirty="0"/>
+              <a:t> remove method</a:t>
+            </a:r>
+          </a:p>
+          <a:p>
+            <a:endParaRPr lang="en-US" dirty="0"/>
+          </a:p>
+        </p:txBody>
+      </p:sp>
+    </p:spTree>
+    <p:extLst>
+      <p:ext uri="{BB962C8B-B14F-4D97-AF65-F5344CB8AC3E}">
+        <p14:creationId xmlns:p14="http://schemas.microsoft.com/office/powerpoint/2010/main" val="4172965719"/>
+      </p:ext>
+    </p:extLst>
+  </p:cSld>
+  <p:clrMapOvr>
+    <a:masterClrMapping/>
+  </p:clrMapOvr>
+</p:sld>
+</file>
+
 <file path=ppt/slides/slide2.xml><?xml version="1.0" encoding="utf-8"?>
 <p:sld xmlns:a="http://schemas.openxmlformats.org/drawingml/2006/main" xmlns:r="http://schemas.openxmlformats.org/officeDocument/2006/relationships" xmlns:p="http://schemas.openxmlformats.org/presentationml/2006/main">
   <p:cSld>
@@ -4237,10 +4658,14 @@
           <a:p>
             <a:r>
               <a:rPr lang="en-US" dirty="0"/>
-              <a:t>Questions on Lecture 4?</a:t>
-            </a:r>
-          </a:p>
-          <a:p>
+              <a:t>Lecture 4 Exercises</a:t>
+            </a:r>
+          </a:p>
+          <a:p>
+            <a:r>
+              <a:rPr lang="en-US" dirty="0"/>
+              <a:t>Implement </a:t>
+            </a:r>
             <a:r>
               <a:rPr lang="en-US" dirty="0" err="1"/>
               <a:t>ArrayList</a:t>
@@ -4284,561 +4709,116 @@
       </p:grpSpPr>
       <p:sp>
         <p:nvSpPr>
-          <p:cNvPr id="2" name="Title 1">
-            <a:extLst>
-              <a:ext uri="{FF2B5EF4-FFF2-40B4-BE49-F238E27FC236}">
-                <a16:creationId xmlns:a16="http://schemas.microsoft.com/office/drawing/2014/main" id="{667F14FE-46DC-4C67-A4A6-058A50EB9355}"/>
-              </a:ext>
-            </a:extLst>
-          </p:cNvPr>
-          <p:cNvSpPr>
-            <a:spLocks noGrp="1"/>
-          </p:cNvSpPr>
-          <p:nvPr>
-            <p:ph type="title"/>
-          </p:nvPr>
-        </p:nvSpPr>
-        <p:spPr/>
-        <p:txBody>
-          <a:bodyPr/>
-          <a:lstStyle/>
-          <a:p>
-            <a:r>
-              <a:rPr lang="en-US" dirty="0" err="1"/>
-              <a:t>StringList</a:t>
-            </a:r>
-            <a:r>
-              <a:rPr lang="en-US" dirty="0"/>
-              <a:t> Interface</a:t>
-            </a:r>
-          </a:p>
-        </p:txBody>
-      </p:sp>
-      <p:sp>
-        <p:nvSpPr>
-          <p:cNvPr id="7" name="TextBox 6">
-            <a:extLst>
-              <a:ext uri="{FF2B5EF4-FFF2-40B4-BE49-F238E27FC236}">
-                <a16:creationId xmlns:a16="http://schemas.microsoft.com/office/drawing/2014/main" id="{5E087A33-8FB7-4030-9303-6480F6F9ABEE}"/>
-              </a:ext>
-            </a:extLst>
-          </p:cNvPr>
-          <p:cNvSpPr txBox="1"/>
-          <p:nvPr/>
+          <p:cNvPr id="3" name="Content Placeholder 2">
+            <a:extLst>
+              <a:ext uri="{FF2B5EF4-FFF2-40B4-BE49-F238E27FC236}">
+                <a16:creationId xmlns:a16="http://schemas.microsoft.com/office/drawing/2014/main" id="{7B30257C-BC7F-40B2-A999-0DB005B48C25}"/>
+              </a:ext>
+            </a:extLst>
+          </p:cNvPr>
+          <p:cNvSpPr>
+            <a:spLocks noGrp="1"/>
+          </p:cNvSpPr>
+          <p:nvPr>
+            <p:ph idx="1"/>
+          </p:nvPr>
         </p:nvSpPr>
         <p:spPr>
           <a:xfrm>
-            <a:off x="628648" y="1019351"/>
-            <a:ext cx="6493010" cy="3970318"/>
+            <a:off x="4105848" y="74184"/>
+            <a:ext cx="4998776" cy="5035956"/>
+          </a:xfrm>
+        </p:spPr>
+        <p:txBody>
+          <a:bodyPr/>
+          <a:lstStyle/>
+          <a:p>
+            <a:pPr marL="0" indent="0">
+              <a:buNone/>
+            </a:pPr>
+            <a:r>
+              <a:rPr lang="en-US" dirty="0"/>
+              <a:t>During the pre-lecture recording, we commented out insert and remove method. Why?</a:t>
+            </a:r>
+          </a:p>
+          <a:p>
+            <a:pPr marL="0" indent="0">
+              <a:buNone/>
+            </a:pPr>
+            <a:endParaRPr lang="en-US" dirty="0"/>
+          </a:p>
+          <a:p>
+            <a:pPr marL="457200" indent="-457200">
+              <a:buAutoNum type="alphaUcPeriod"/>
+            </a:pPr>
+            <a:r>
+              <a:rPr lang="en-US" dirty="0"/>
+              <a:t>We didn’t plan to implement them at that time and commenting out them will make our code cleaner</a:t>
+            </a:r>
+          </a:p>
+          <a:p>
+            <a:pPr marL="457200" indent="-457200">
+              <a:buAutoNum type="alphaUcPeriod"/>
+            </a:pPr>
+            <a:r>
+              <a:rPr lang="en-US" dirty="0"/>
+              <a:t>We didn’t plan to implement them and commenting them out will avoid a compiler error</a:t>
+            </a:r>
+          </a:p>
+          <a:p>
+            <a:pPr marL="457200" indent="-457200">
+              <a:buAutoNum type="alphaUcPeriod"/>
+            </a:pPr>
+            <a:r>
+              <a:rPr lang="en-US" dirty="0"/>
+              <a:t>We were overloading those two methods</a:t>
+            </a:r>
+          </a:p>
+          <a:p>
+            <a:pPr marL="457200" indent="-457200">
+              <a:buAutoNum type="alphaUcPeriod"/>
+            </a:pPr>
+            <a:r>
+              <a:rPr lang="en-US" dirty="0"/>
+              <a:t>None of the above</a:t>
+            </a:r>
+          </a:p>
+        </p:txBody>
+      </p:sp>
+      <p:pic>
+        <p:nvPicPr>
+          <p:cNvPr id="4" name="Picture 3">
+            <a:extLst>
+              <a:ext uri="{FF2B5EF4-FFF2-40B4-BE49-F238E27FC236}">
+                <a16:creationId xmlns:a16="http://schemas.microsoft.com/office/drawing/2014/main" id="{DD02A69F-447C-47E6-AF01-D42E1D0F5956}"/>
+              </a:ext>
+            </a:extLst>
+          </p:cNvPr>
+          <p:cNvPicPr>
+            <a:picLocks noChangeAspect="1"/>
+          </p:cNvPicPr>
+          <p:nvPr/>
+        </p:nvPicPr>
+        <p:blipFill>
+          <a:blip r:embed="rId2"/>
+          <a:stretch>
+            <a:fillRect/>
+          </a:stretch>
+        </p:blipFill>
+        <p:spPr>
+          <a:xfrm>
+            <a:off x="14572" y="3643"/>
+            <a:ext cx="4105848" cy="2648320"/>
           </a:xfrm>
           <a:prstGeom prst="rect">
             <a:avLst/>
           </a:prstGeom>
-          <a:noFill/>
         </p:spPr>
-        <p:txBody>
-          <a:bodyPr wrap="square">
-            <a:spAutoFit/>
-          </a:bodyPr>
-          <a:lstStyle/>
-          <a:p>
-            <a:pPr algn="l"/>
-            <a:r>
-              <a:rPr lang="en-US" sz="1400" b="1" dirty="0">
-                <a:solidFill>
-                  <a:srgbClr val="7F0055"/>
-                </a:solidFill>
-                <a:latin typeface="Consolas" panose="020B0609020204030204" pitchFamily="49" charset="0"/>
-              </a:rPr>
-              <a:t>public</a:t>
-            </a:r>
-            <a:r>
-              <a:rPr lang="en-US" sz="1400" b="1" dirty="0">
-                <a:solidFill>
-                  <a:srgbClr val="000000"/>
-                </a:solidFill>
-                <a:latin typeface="Consolas" panose="020B0609020204030204" pitchFamily="49" charset="0"/>
-              </a:rPr>
-              <a:t> </a:t>
-            </a:r>
-            <a:r>
-              <a:rPr lang="en-US" sz="1400" b="1" dirty="0">
-                <a:solidFill>
-                  <a:srgbClr val="7F0055"/>
-                </a:solidFill>
-                <a:latin typeface="Consolas" panose="020B0609020204030204" pitchFamily="49" charset="0"/>
-              </a:rPr>
-              <a:t>interface</a:t>
-            </a:r>
-            <a:r>
-              <a:rPr lang="en-US" sz="1400" b="1" dirty="0">
-                <a:solidFill>
-                  <a:srgbClr val="000000"/>
-                </a:solidFill>
-                <a:latin typeface="Consolas" panose="020B0609020204030204" pitchFamily="49" charset="0"/>
-              </a:rPr>
-              <a:t> </a:t>
-            </a:r>
-            <a:r>
-              <a:rPr lang="en-US" sz="1400" b="1" dirty="0" err="1">
-                <a:solidFill>
-                  <a:srgbClr val="000000"/>
-                </a:solidFill>
-                <a:latin typeface="Consolas" panose="020B0609020204030204" pitchFamily="49" charset="0"/>
-              </a:rPr>
-              <a:t>StringList</a:t>
-            </a:r>
-            <a:r>
-              <a:rPr lang="en-US" sz="1400" b="1" dirty="0">
-                <a:solidFill>
-                  <a:srgbClr val="000000"/>
-                </a:solidFill>
-                <a:latin typeface="Consolas" panose="020B0609020204030204" pitchFamily="49" charset="0"/>
-              </a:rPr>
-              <a:t> {</a:t>
-            </a:r>
-          </a:p>
-          <a:p>
-            <a:pPr algn="l"/>
-            <a:endParaRPr lang="en-US" sz="1400" dirty="0">
-              <a:latin typeface="Consolas" panose="020B0609020204030204" pitchFamily="49" charset="0"/>
-            </a:endParaRPr>
-          </a:p>
-          <a:p>
-            <a:pPr algn="l"/>
-            <a:r>
-              <a:rPr lang="en-US" sz="1400" dirty="0">
-                <a:solidFill>
-                  <a:srgbClr val="000000"/>
-                </a:solidFill>
-                <a:latin typeface="Consolas" panose="020B0609020204030204" pitchFamily="49" charset="0"/>
-              </a:rPr>
-              <a:t>  </a:t>
-            </a:r>
-            <a:r>
-              <a:rPr lang="en-US" sz="1400" dirty="0">
-                <a:solidFill>
-                  <a:srgbClr val="3F7F5F"/>
-                </a:solidFill>
-                <a:latin typeface="Consolas" panose="020B0609020204030204" pitchFamily="49" charset="0"/>
-              </a:rPr>
-              <a:t>/* Add an element at the end of the list */</a:t>
-            </a:r>
-          </a:p>
-          <a:p>
-            <a:pPr algn="l"/>
-            <a:r>
-              <a:rPr lang="en-US" sz="1400" dirty="0">
-                <a:solidFill>
-                  <a:srgbClr val="000000"/>
-                </a:solidFill>
-                <a:latin typeface="Consolas" panose="020B0609020204030204" pitchFamily="49" charset="0"/>
-              </a:rPr>
-              <a:t>  </a:t>
-            </a:r>
-            <a:r>
-              <a:rPr lang="en-US" sz="1400" b="1" dirty="0">
-                <a:solidFill>
-                  <a:srgbClr val="7F0055"/>
-                </a:solidFill>
-                <a:latin typeface="Consolas" panose="020B0609020204030204" pitchFamily="49" charset="0"/>
-              </a:rPr>
-              <a:t>void</a:t>
-            </a:r>
-            <a:r>
-              <a:rPr lang="en-US" sz="1400" b="1" dirty="0">
-                <a:solidFill>
-                  <a:srgbClr val="000000"/>
-                </a:solidFill>
-                <a:latin typeface="Consolas" panose="020B0609020204030204" pitchFamily="49" charset="0"/>
-              </a:rPr>
-              <a:t> add(String </a:t>
-            </a:r>
-            <a:r>
-              <a:rPr lang="en-US" sz="1400" b="1" dirty="0">
-                <a:solidFill>
-                  <a:srgbClr val="6A3E3E"/>
-                </a:solidFill>
-                <a:latin typeface="Consolas" panose="020B0609020204030204" pitchFamily="49" charset="0"/>
-              </a:rPr>
-              <a:t>s</a:t>
-            </a:r>
-            <a:r>
-              <a:rPr lang="en-US" sz="1400" b="1" dirty="0">
-                <a:solidFill>
-                  <a:srgbClr val="000000"/>
-                </a:solidFill>
-                <a:latin typeface="Consolas" panose="020B0609020204030204" pitchFamily="49" charset="0"/>
-              </a:rPr>
-              <a:t>);</a:t>
-            </a:r>
-          </a:p>
-          <a:p>
-            <a:pPr algn="l"/>
-            <a:endParaRPr lang="en-US" sz="1400" dirty="0">
-              <a:latin typeface="Consolas" panose="020B0609020204030204" pitchFamily="49" charset="0"/>
-            </a:endParaRPr>
-          </a:p>
-          <a:p>
-            <a:pPr algn="l"/>
-            <a:r>
-              <a:rPr lang="en-US" sz="1400" dirty="0">
-                <a:solidFill>
-                  <a:srgbClr val="000000"/>
-                </a:solidFill>
-                <a:latin typeface="Consolas" panose="020B0609020204030204" pitchFamily="49" charset="0"/>
-              </a:rPr>
-              <a:t>  </a:t>
-            </a:r>
-            <a:r>
-              <a:rPr lang="en-US" sz="1400" dirty="0">
-                <a:solidFill>
-                  <a:srgbClr val="3F7F5F"/>
-                </a:solidFill>
-                <a:latin typeface="Consolas" panose="020B0609020204030204" pitchFamily="49" charset="0"/>
-              </a:rPr>
-              <a:t>/* Get the element at the given index */</a:t>
-            </a:r>
-          </a:p>
-          <a:p>
-            <a:pPr algn="l"/>
-            <a:r>
-              <a:rPr lang="en-US" sz="1400" dirty="0">
-                <a:solidFill>
-                  <a:srgbClr val="000000"/>
-                </a:solidFill>
-                <a:latin typeface="Consolas" panose="020B0609020204030204" pitchFamily="49" charset="0"/>
-              </a:rPr>
-              <a:t>  String get(</a:t>
-            </a:r>
-            <a:r>
-              <a:rPr lang="en-US" sz="1400" b="1" dirty="0">
-                <a:solidFill>
-                  <a:srgbClr val="7F0055"/>
-                </a:solidFill>
-                <a:latin typeface="Consolas" panose="020B0609020204030204" pitchFamily="49" charset="0"/>
-              </a:rPr>
-              <a:t>int</a:t>
-            </a:r>
-            <a:r>
-              <a:rPr lang="en-US" sz="1400" b="1" dirty="0">
-                <a:solidFill>
-                  <a:srgbClr val="000000"/>
-                </a:solidFill>
-                <a:latin typeface="Consolas" panose="020B0609020204030204" pitchFamily="49" charset="0"/>
-              </a:rPr>
-              <a:t> </a:t>
-            </a:r>
-            <a:r>
-              <a:rPr lang="en-US" sz="1400" b="1" dirty="0">
-                <a:solidFill>
-                  <a:srgbClr val="6A3E3E"/>
-                </a:solidFill>
-                <a:latin typeface="Consolas" panose="020B0609020204030204" pitchFamily="49" charset="0"/>
-              </a:rPr>
-              <a:t>index</a:t>
-            </a:r>
-            <a:r>
-              <a:rPr lang="en-US" sz="1400" b="1" dirty="0">
-                <a:solidFill>
-                  <a:srgbClr val="000000"/>
-                </a:solidFill>
-                <a:latin typeface="Consolas" panose="020B0609020204030204" pitchFamily="49" charset="0"/>
-              </a:rPr>
-              <a:t>);</a:t>
-            </a:r>
-          </a:p>
-          <a:p>
-            <a:pPr algn="l"/>
-            <a:endParaRPr lang="en-US" sz="1400" dirty="0">
-              <a:latin typeface="Consolas" panose="020B0609020204030204" pitchFamily="49" charset="0"/>
-            </a:endParaRPr>
-          </a:p>
-          <a:p>
-            <a:pPr algn="l"/>
-            <a:r>
-              <a:rPr lang="en-US" sz="1400" dirty="0">
-                <a:solidFill>
-                  <a:srgbClr val="000000"/>
-                </a:solidFill>
-                <a:latin typeface="Consolas" panose="020B0609020204030204" pitchFamily="49" charset="0"/>
-              </a:rPr>
-              <a:t>  </a:t>
-            </a:r>
-            <a:r>
-              <a:rPr lang="en-US" sz="1400" dirty="0">
-                <a:solidFill>
-                  <a:srgbClr val="3F7F5F"/>
-                </a:solidFill>
-                <a:latin typeface="Consolas" panose="020B0609020204030204" pitchFamily="49" charset="0"/>
-              </a:rPr>
-              <a:t>/* Get the number of elements in the list */</a:t>
-            </a:r>
-          </a:p>
-          <a:p>
-            <a:pPr algn="l"/>
-            <a:r>
-              <a:rPr lang="en-US" sz="1400" dirty="0">
-                <a:solidFill>
-                  <a:srgbClr val="000000"/>
-                </a:solidFill>
-                <a:latin typeface="Consolas" panose="020B0609020204030204" pitchFamily="49" charset="0"/>
-              </a:rPr>
-              <a:t>  </a:t>
-            </a:r>
-            <a:r>
-              <a:rPr lang="en-US" sz="1400" b="1" dirty="0">
-                <a:solidFill>
-                  <a:srgbClr val="7F0055"/>
-                </a:solidFill>
-                <a:latin typeface="Consolas" panose="020B0609020204030204" pitchFamily="49" charset="0"/>
-              </a:rPr>
-              <a:t>int</a:t>
-            </a:r>
-            <a:r>
-              <a:rPr lang="en-US" sz="1400" b="1" dirty="0">
-                <a:solidFill>
-                  <a:srgbClr val="000000"/>
-                </a:solidFill>
-                <a:latin typeface="Consolas" panose="020B0609020204030204" pitchFamily="49" charset="0"/>
-              </a:rPr>
-              <a:t> size();</a:t>
-            </a:r>
-          </a:p>
-          <a:p>
-            <a:pPr algn="l"/>
-            <a:endParaRPr lang="en-US" sz="1400" dirty="0">
-              <a:latin typeface="Consolas" panose="020B0609020204030204" pitchFamily="49" charset="0"/>
-            </a:endParaRPr>
-          </a:p>
-          <a:p>
-            <a:pPr algn="l"/>
-            <a:r>
-              <a:rPr lang="en-US" sz="1400" dirty="0">
-                <a:solidFill>
-                  <a:srgbClr val="000000"/>
-                </a:solidFill>
-                <a:latin typeface="Consolas" panose="020B0609020204030204" pitchFamily="49" charset="0"/>
-              </a:rPr>
-              <a:t>  </a:t>
-            </a:r>
-            <a:r>
-              <a:rPr lang="en-US" sz="1400" dirty="0">
-                <a:solidFill>
-                  <a:srgbClr val="3F7F5F"/>
-                </a:solidFill>
-                <a:latin typeface="Consolas" panose="020B0609020204030204" pitchFamily="49" charset="0"/>
-              </a:rPr>
-              <a:t>/* Add an element at the specified index */</a:t>
-            </a:r>
-          </a:p>
-          <a:p>
-            <a:pPr algn="l"/>
-            <a:r>
-              <a:rPr lang="en-US" sz="1400" dirty="0">
-                <a:solidFill>
-                  <a:srgbClr val="000000"/>
-                </a:solidFill>
-                <a:latin typeface="Consolas" panose="020B0609020204030204" pitchFamily="49" charset="0"/>
-              </a:rPr>
-              <a:t>  </a:t>
-            </a:r>
-            <a:r>
-              <a:rPr lang="en-US" sz="1400" b="1" dirty="0">
-                <a:solidFill>
-                  <a:srgbClr val="7F0055"/>
-                </a:solidFill>
-                <a:latin typeface="Consolas" panose="020B0609020204030204" pitchFamily="49" charset="0"/>
-              </a:rPr>
-              <a:t>void</a:t>
-            </a:r>
-            <a:r>
-              <a:rPr lang="en-US" sz="1400" b="1" dirty="0">
-                <a:solidFill>
-                  <a:srgbClr val="000000"/>
-                </a:solidFill>
-                <a:latin typeface="Consolas" panose="020B0609020204030204" pitchFamily="49" charset="0"/>
-              </a:rPr>
-              <a:t> insert(</a:t>
-            </a:r>
-            <a:r>
-              <a:rPr lang="en-US" sz="1400" b="1" dirty="0">
-                <a:solidFill>
-                  <a:srgbClr val="7F0055"/>
-                </a:solidFill>
-                <a:latin typeface="Consolas" panose="020B0609020204030204" pitchFamily="49" charset="0"/>
-              </a:rPr>
-              <a:t>int</a:t>
-            </a:r>
-            <a:r>
-              <a:rPr lang="en-US" sz="1400" b="1" dirty="0">
-                <a:solidFill>
-                  <a:srgbClr val="000000"/>
-                </a:solidFill>
-                <a:latin typeface="Consolas" panose="020B0609020204030204" pitchFamily="49" charset="0"/>
-              </a:rPr>
-              <a:t> </a:t>
-            </a:r>
-            <a:r>
-              <a:rPr lang="en-US" sz="1400" b="1" dirty="0">
-                <a:solidFill>
-                  <a:srgbClr val="6A3E3E"/>
-                </a:solidFill>
-                <a:latin typeface="Consolas" panose="020B0609020204030204" pitchFamily="49" charset="0"/>
-              </a:rPr>
-              <a:t>index</a:t>
-            </a:r>
-            <a:r>
-              <a:rPr lang="en-US" sz="1400" b="1" dirty="0">
-                <a:solidFill>
-                  <a:srgbClr val="000000"/>
-                </a:solidFill>
-                <a:latin typeface="Consolas" panose="020B0609020204030204" pitchFamily="49" charset="0"/>
-              </a:rPr>
-              <a:t>, String </a:t>
-            </a:r>
-            <a:r>
-              <a:rPr lang="en-US" sz="1400" b="1" dirty="0">
-                <a:solidFill>
-                  <a:srgbClr val="6A3E3E"/>
-                </a:solidFill>
-                <a:latin typeface="Consolas" panose="020B0609020204030204" pitchFamily="49" charset="0"/>
-              </a:rPr>
-              <a:t>s</a:t>
-            </a:r>
-            <a:r>
-              <a:rPr lang="en-US" sz="1400" b="1" dirty="0">
-                <a:solidFill>
-                  <a:srgbClr val="000000"/>
-                </a:solidFill>
-                <a:latin typeface="Consolas" panose="020B0609020204030204" pitchFamily="49" charset="0"/>
-              </a:rPr>
-              <a:t>);</a:t>
-            </a:r>
-          </a:p>
-          <a:p>
-            <a:pPr algn="l"/>
-            <a:endParaRPr lang="en-US" sz="1400" dirty="0">
-              <a:latin typeface="Consolas" panose="020B0609020204030204" pitchFamily="49" charset="0"/>
-            </a:endParaRPr>
-          </a:p>
-          <a:p>
-            <a:pPr algn="l"/>
-            <a:r>
-              <a:rPr lang="en-US" sz="1400" dirty="0">
-                <a:solidFill>
-                  <a:srgbClr val="000000"/>
-                </a:solidFill>
-                <a:latin typeface="Consolas" panose="020B0609020204030204" pitchFamily="49" charset="0"/>
-              </a:rPr>
-              <a:t>  </a:t>
-            </a:r>
-            <a:r>
-              <a:rPr lang="en-US" sz="1400" dirty="0">
-                <a:solidFill>
-                  <a:srgbClr val="3F7F5F"/>
-                </a:solidFill>
-                <a:latin typeface="Consolas" panose="020B0609020204030204" pitchFamily="49" charset="0"/>
-              </a:rPr>
-              <a:t>/* Remove the element at the specified index */</a:t>
-            </a:r>
-          </a:p>
-          <a:p>
-            <a:pPr algn="l"/>
-            <a:r>
-              <a:rPr lang="en-US" sz="1400" dirty="0">
-                <a:solidFill>
-                  <a:srgbClr val="000000"/>
-                </a:solidFill>
-                <a:latin typeface="Consolas" panose="020B0609020204030204" pitchFamily="49" charset="0"/>
-              </a:rPr>
-              <a:t>  </a:t>
-            </a:r>
-            <a:r>
-              <a:rPr lang="en-US" sz="1400" b="1" dirty="0">
-                <a:solidFill>
-                  <a:srgbClr val="7F0055"/>
-                </a:solidFill>
-                <a:latin typeface="Consolas" panose="020B0609020204030204" pitchFamily="49" charset="0"/>
-              </a:rPr>
-              <a:t>void</a:t>
-            </a:r>
-            <a:r>
-              <a:rPr lang="en-US" sz="1400" b="1" dirty="0">
-                <a:solidFill>
-                  <a:srgbClr val="000000"/>
-                </a:solidFill>
-                <a:latin typeface="Consolas" panose="020B0609020204030204" pitchFamily="49" charset="0"/>
-              </a:rPr>
-              <a:t> remove(</a:t>
-            </a:r>
-            <a:r>
-              <a:rPr lang="en-US" sz="1400" b="1" dirty="0">
-                <a:solidFill>
-                  <a:srgbClr val="7F0055"/>
-                </a:solidFill>
-                <a:latin typeface="Consolas" panose="020B0609020204030204" pitchFamily="49" charset="0"/>
-              </a:rPr>
-              <a:t>int</a:t>
-            </a:r>
-            <a:r>
-              <a:rPr lang="en-US" sz="1400" b="1" dirty="0">
-                <a:solidFill>
-                  <a:srgbClr val="000000"/>
-                </a:solidFill>
-                <a:latin typeface="Consolas" panose="020B0609020204030204" pitchFamily="49" charset="0"/>
-              </a:rPr>
-              <a:t> </a:t>
-            </a:r>
-            <a:r>
-              <a:rPr lang="en-US" sz="1400" b="1" dirty="0">
-                <a:solidFill>
-                  <a:srgbClr val="6A3E3E"/>
-                </a:solidFill>
-                <a:latin typeface="Consolas" panose="020B0609020204030204" pitchFamily="49" charset="0"/>
-              </a:rPr>
-              <a:t>index</a:t>
-            </a:r>
-            <a:r>
-              <a:rPr lang="en-US" sz="1400" b="1" dirty="0">
-                <a:solidFill>
-                  <a:srgbClr val="000000"/>
-                </a:solidFill>
-                <a:latin typeface="Consolas" panose="020B0609020204030204" pitchFamily="49" charset="0"/>
-              </a:rPr>
-              <a:t>);</a:t>
-            </a:r>
-          </a:p>
-          <a:p>
-            <a:pPr algn="l"/>
-            <a:r>
-              <a:rPr lang="en-US" sz="1400" dirty="0">
-                <a:solidFill>
-                  <a:srgbClr val="000000"/>
-                </a:solidFill>
-                <a:latin typeface="Consolas" panose="020B0609020204030204" pitchFamily="49" charset="0"/>
-              </a:rPr>
-              <a:t>  </a:t>
-            </a:r>
-          </a:p>
-          <a:p>
-            <a:pPr algn="l"/>
-            <a:r>
-              <a:rPr lang="en-US" sz="1400" dirty="0">
-                <a:solidFill>
-                  <a:srgbClr val="000000"/>
-                </a:solidFill>
-                <a:latin typeface="Consolas" panose="020B0609020204030204" pitchFamily="49" charset="0"/>
-              </a:rPr>
-              <a:t>}</a:t>
-            </a:r>
-          </a:p>
-        </p:txBody>
-      </p:sp>
+      </p:pic>
     </p:spTree>
     <p:extLst>
       <p:ext uri="{BB962C8B-B14F-4D97-AF65-F5344CB8AC3E}">
-        <p14:creationId xmlns:p14="http://schemas.microsoft.com/office/powerpoint/2010/main" val="2704561090"/>
+        <p14:creationId xmlns:p14="http://schemas.microsoft.com/office/powerpoint/2010/main" val="1420085469"/>
       </p:ext>
     </p:extLst>
   </p:cSld>
@@ -4867,184 +4847,154 @@
       </p:grpSpPr>
       <p:sp>
         <p:nvSpPr>
-          <p:cNvPr id="2" name="Title 1">
-            <a:extLst>
-              <a:ext uri="{FF2B5EF4-FFF2-40B4-BE49-F238E27FC236}">
-                <a16:creationId xmlns:a16="http://schemas.microsoft.com/office/drawing/2014/main" id="{D22F19BB-D2D4-4322-957A-C89126D13059}"/>
-              </a:ext>
-            </a:extLst>
-          </p:cNvPr>
-          <p:cNvSpPr>
-            <a:spLocks noGrp="1"/>
-          </p:cNvSpPr>
-          <p:nvPr>
-            <p:ph type="title"/>
-          </p:nvPr>
-        </p:nvSpPr>
-        <p:spPr/>
+          <p:cNvPr id="3" name="Content Placeholder 2">
+            <a:extLst>
+              <a:ext uri="{FF2B5EF4-FFF2-40B4-BE49-F238E27FC236}">
+                <a16:creationId xmlns:a16="http://schemas.microsoft.com/office/drawing/2014/main" id="{64462D6F-7A85-458A-93C0-2F829C41FDFF}"/>
+              </a:ext>
+            </a:extLst>
+          </p:cNvPr>
+          <p:cNvSpPr>
+            <a:spLocks noGrp="1"/>
+          </p:cNvSpPr>
+          <p:nvPr>
+            <p:ph idx="1"/>
+          </p:nvPr>
+        </p:nvSpPr>
+        <p:spPr>
+          <a:xfrm>
+            <a:off x="0" y="0"/>
+            <a:ext cx="7886700" cy="1413164"/>
+          </a:xfrm>
+        </p:spPr>
         <p:txBody>
           <a:bodyPr/>
           <a:lstStyle/>
           <a:p>
+            <a:pPr marL="0" indent="0">
+              <a:buNone/>
+            </a:pPr>
+            <a:r>
+              <a:rPr lang="en-US" dirty="0"/>
+              <a:t>In the </a:t>
+            </a:r>
             <a:r>
               <a:rPr lang="en-US" dirty="0" err="1"/>
-              <a:t>ArrayList</a:t>
-            </a:r>
-            <a:r>
-              <a:rPr lang="en-US" dirty="0"/>
-              <a:t> Insert</a:t>
-            </a:r>
-          </a:p>
-        </p:txBody>
-      </p:sp>
-      <p:sp>
-        <p:nvSpPr>
-          <p:cNvPr id="3" name="Content Placeholder 2">
-            <a:extLst>
-              <a:ext uri="{FF2B5EF4-FFF2-40B4-BE49-F238E27FC236}">
-                <a16:creationId xmlns:a16="http://schemas.microsoft.com/office/drawing/2014/main" id="{0B7C949A-8ABD-489D-9873-B9F0A823A2C7}"/>
-              </a:ext>
-            </a:extLst>
-          </p:cNvPr>
-          <p:cNvSpPr>
-            <a:spLocks noGrp="1"/>
-          </p:cNvSpPr>
-          <p:nvPr>
-            <p:ph idx="1"/>
-          </p:nvPr>
-        </p:nvSpPr>
-        <p:spPr/>
-        <p:txBody>
-          <a:bodyPr/>
-          <a:lstStyle/>
-          <a:p>
-            <a:pPr marL="0" indent="0" algn="l">
+              <a:t>ArrayStringList</a:t>
+            </a:r>
+            <a:r>
+              <a:rPr lang="en-US" dirty="0"/>
+              <a:t> class, we have the following fields</a:t>
+            </a:r>
+          </a:p>
+          <a:p>
+            <a:pPr marL="0" indent="0">
               <a:buNone/>
             </a:pPr>
             <a:r>
-              <a:rPr lang="en-US" sz="2400" dirty="0">
-                <a:solidFill>
-                  <a:srgbClr val="3F7F5F"/>
-                </a:solidFill>
-                <a:latin typeface="Consolas" panose="020B0609020204030204" pitchFamily="49" charset="0"/>
-              </a:rPr>
-              <a:t>/* Add an element at the specified index */</a:t>
-            </a:r>
-          </a:p>
-          <a:p>
-            <a:pPr marL="0" indent="0" algn="l">
+              <a:rPr lang="en-US" dirty="0">
+                <a:latin typeface="Courier New" panose="02070309020205020404" pitchFamily="49" charset="0"/>
+                <a:cs typeface="Courier New" panose="02070309020205020404" pitchFamily="49" charset="0"/>
+              </a:rPr>
+              <a:t>String[] elements;</a:t>
+            </a:r>
+          </a:p>
+          <a:p>
+            <a:pPr marL="0" indent="0">
               <a:buNone/>
             </a:pPr>
             <a:r>
-              <a:rPr lang="en-US" sz="2400" b="1" dirty="0">
-                <a:solidFill>
-                  <a:srgbClr val="7F0055"/>
-                </a:solidFill>
-                <a:latin typeface="Consolas" panose="020B0609020204030204" pitchFamily="49" charset="0"/>
-              </a:rPr>
-              <a:t>void</a:t>
-            </a:r>
-            <a:r>
-              <a:rPr lang="en-US" sz="2400" b="1" dirty="0">
-                <a:solidFill>
-                  <a:srgbClr val="000000"/>
-                </a:solidFill>
-                <a:latin typeface="Consolas" panose="020B0609020204030204" pitchFamily="49" charset="0"/>
-              </a:rPr>
-              <a:t> insert(</a:t>
-            </a:r>
-            <a:r>
-              <a:rPr lang="en-US" sz="2400" b="1" dirty="0">
-                <a:solidFill>
-                  <a:srgbClr val="7F0055"/>
-                </a:solidFill>
-                <a:latin typeface="Consolas" panose="020B0609020204030204" pitchFamily="49" charset="0"/>
-              </a:rPr>
-              <a:t>int</a:t>
-            </a:r>
-            <a:r>
-              <a:rPr lang="en-US" sz="2400" b="1" dirty="0">
-                <a:solidFill>
-                  <a:srgbClr val="000000"/>
-                </a:solidFill>
-                <a:latin typeface="Consolas" panose="020B0609020204030204" pitchFamily="49" charset="0"/>
-              </a:rPr>
-              <a:t> </a:t>
-            </a:r>
-            <a:r>
-              <a:rPr lang="en-US" sz="2400" b="1" dirty="0">
-                <a:solidFill>
-                  <a:srgbClr val="6A3E3E"/>
-                </a:solidFill>
-                <a:latin typeface="Consolas" panose="020B0609020204030204" pitchFamily="49" charset="0"/>
-              </a:rPr>
-              <a:t>index</a:t>
-            </a:r>
-            <a:r>
-              <a:rPr lang="en-US" sz="2400" b="1" dirty="0">
-                <a:solidFill>
-                  <a:srgbClr val="000000"/>
-                </a:solidFill>
-                <a:latin typeface="Consolas" panose="020B0609020204030204" pitchFamily="49" charset="0"/>
-              </a:rPr>
-              <a:t>, String </a:t>
-            </a:r>
-            <a:r>
-              <a:rPr lang="en-US" sz="2400" b="1" dirty="0">
-                <a:solidFill>
-                  <a:srgbClr val="6A3E3E"/>
-                </a:solidFill>
-                <a:latin typeface="Consolas" panose="020B0609020204030204" pitchFamily="49" charset="0"/>
-              </a:rPr>
-              <a:t>s</a:t>
-            </a:r>
-            <a:r>
-              <a:rPr lang="en-US" sz="2400" b="1" dirty="0">
-                <a:solidFill>
-                  <a:srgbClr val="000000"/>
-                </a:solidFill>
-                <a:latin typeface="Consolas" panose="020B0609020204030204" pitchFamily="49" charset="0"/>
-              </a:rPr>
-              <a:t>);</a:t>
-            </a:r>
-          </a:p>
-          <a:p>
-            <a:pPr marL="0" indent="0" algn="l">
-              <a:buNone/>
+              <a:rPr lang="en-US" dirty="0">
+                <a:latin typeface="Courier New" panose="02070309020205020404" pitchFamily="49" charset="0"/>
+                <a:cs typeface="Courier New" panose="02070309020205020404" pitchFamily="49" charset="0"/>
+              </a:rPr>
+              <a:t>int size;</a:t>
+            </a:r>
+            <a:r>
+              <a:rPr lang="en-US" dirty="0"/>
+              <a:t>	</a:t>
+            </a:r>
+          </a:p>
+        </p:txBody>
+      </p:sp>
+      <p:sp>
+        <p:nvSpPr>
+          <p:cNvPr id="4" name="TextBox 3">
+            <a:extLst>
+              <a:ext uri="{FF2B5EF4-FFF2-40B4-BE49-F238E27FC236}">
+                <a16:creationId xmlns:a16="http://schemas.microsoft.com/office/drawing/2014/main" id="{87CA6D06-DC30-40E2-BCB0-B041D7DAA1D3}"/>
+              </a:ext>
+            </a:extLst>
+          </p:cNvPr>
+          <p:cNvSpPr txBox="1"/>
+          <p:nvPr/>
+        </p:nvSpPr>
+        <p:spPr>
+          <a:xfrm>
+            <a:off x="0" y="1658170"/>
+            <a:ext cx="8647495" cy="1754326"/>
+          </a:xfrm>
+          <a:prstGeom prst="rect">
+            <a:avLst/>
+          </a:prstGeom>
+          <a:noFill/>
+        </p:spPr>
+        <p:txBody>
+          <a:bodyPr wrap="none" rtlCol="0">
+            <a:spAutoFit/>
+          </a:bodyPr>
+          <a:lstStyle/>
+          <a:p>
+            <a:r>
+              <a:rPr lang="en-US" dirty="0"/>
+              <a:t>What’s the point of having size as instance variable as the array elements already has size?</a:t>
+            </a:r>
+          </a:p>
+          <a:p>
+            <a:endParaRPr lang="en-US" dirty="0"/>
+          </a:p>
+          <a:p>
+            <a:pPr marL="342900" indent="-342900">
+              <a:buAutoNum type="alphaUcPeriod"/>
             </a:pPr>
-            <a:endParaRPr lang="en-US" sz="2400" b="1" dirty="0">
-              <a:solidFill>
-                <a:srgbClr val="000000"/>
-              </a:solidFill>
-              <a:latin typeface="Consolas" panose="020B0609020204030204" pitchFamily="49" charset="0"/>
-            </a:endParaRPr>
-          </a:p>
-          <a:p>
-            <a:r>
-              <a:rPr lang="en-US" dirty="0"/>
-              <a:t>Write a test case for the </a:t>
+            <a:r>
+              <a:rPr lang="en-US" dirty="0"/>
+              <a:t>It is duplicate information for ease of use</a:t>
+            </a:r>
+          </a:p>
+          <a:p>
+            <a:pPr marL="342900" indent="-342900">
+              <a:buAutoNum type="alphaUcPeriod"/>
+            </a:pPr>
+            <a:r>
+              <a:rPr lang="en-US" dirty="0"/>
+              <a:t>It avoid calling </a:t>
             </a:r>
             <a:r>
               <a:rPr lang="en-US" dirty="0" err="1"/>
-              <a:t>ArrayList</a:t>
-            </a:r>
-            <a:r>
-              <a:rPr lang="en-US" dirty="0"/>
-              <a:t> insert method</a:t>
-            </a:r>
-          </a:p>
-          <a:p>
-            <a:r>
-              <a:rPr lang="en-US" dirty="0"/>
-              <a:t>Implement the </a:t>
-            </a:r>
-            <a:r>
-              <a:rPr lang="en-US" dirty="0" err="1"/>
-              <a:t>ArrayList</a:t>
-            </a:r>
-            <a:r>
-              <a:rPr lang="en-US" dirty="0"/>
-              <a:t> insert method</a:t>
+              <a:t>element.length</a:t>
+            </a:r>
+            <a:r>
+              <a:rPr lang="en-US" dirty="0"/>
+              <a:t> to save time</a:t>
+            </a:r>
+          </a:p>
+          <a:p>
+            <a:pPr marL="342900" indent="-342900">
+              <a:buAutoNum type="alphaUcPeriod"/>
+            </a:pPr>
+            <a:r>
+              <a:rPr lang="en-US" dirty="0"/>
+              <a:t>size indicates how full the array is</a:t>
+            </a:r>
+          </a:p>
+          <a:p>
+            <a:pPr marL="342900" indent="-342900">
+              <a:buAutoNum type="alphaUcPeriod"/>
+            </a:pPr>
+            <a:r>
+              <a:rPr lang="en-US" dirty="0"/>
+              <a:t>More than one of the above is correct</a:t>
             </a:r>
           </a:p>
         </p:txBody>
@@ -5052,7 +5002,7 @@
     </p:spTree>
     <p:extLst>
       <p:ext uri="{BB962C8B-B14F-4D97-AF65-F5344CB8AC3E}">
-        <p14:creationId xmlns:p14="http://schemas.microsoft.com/office/powerpoint/2010/main" val="2282631962"/>
+        <p14:creationId xmlns:p14="http://schemas.microsoft.com/office/powerpoint/2010/main" val="23891860"/>
       </p:ext>
     </p:extLst>
   </p:cSld>
@@ -5081,42 +5031,10 @@
       </p:grpSpPr>
       <p:sp>
         <p:nvSpPr>
-          <p:cNvPr id="2" name="Title 1">
-            <a:extLst>
-              <a:ext uri="{FF2B5EF4-FFF2-40B4-BE49-F238E27FC236}">
-                <a16:creationId xmlns:a16="http://schemas.microsoft.com/office/drawing/2014/main" id="{D22F19BB-D2D4-4322-957A-C89126D13059}"/>
-              </a:ext>
-            </a:extLst>
-          </p:cNvPr>
-          <p:cNvSpPr>
-            <a:spLocks noGrp="1"/>
-          </p:cNvSpPr>
-          <p:nvPr>
-            <p:ph type="title"/>
-          </p:nvPr>
-        </p:nvSpPr>
-        <p:spPr/>
-        <p:txBody>
-          <a:bodyPr/>
-          <a:lstStyle/>
-          <a:p>
-            <a:r>
-              <a:rPr lang="en-US" dirty="0" err="1"/>
-              <a:t>ArrayList</a:t>
-            </a:r>
-            <a:r>
-              <a:rPr lang="en-US" dirty="0"/>
-              <a:t> Remove</a:t>
-            </a:r>
-          </a:p>
-        </p:txBody>
-      </p:sp>
-      <p:sp>
-        <p:nvSpPr>
           <p:cNvPr id="3" name="Content Placeholder 2">
             <a:extLst>
               <a:ext uri="{FF2B5EF4-FFF2-40B4-BE49-F238E27FC236}">
-                <a16:creationId xmlns:a16="http://schemas.microsoft.com/office/drawing/2014/main" id="{0B7C949A-8ABD-489D-9873-B9F0A823A2C7}"/>
+                <a16:creationId xmlns:a16="http://schemas.microsoft.com/office/drawing/2014/main" id="{64462D6F-7A85-458A-93C0-2F829C41FDFF}"/>
               </a:ext>
             </a:extLst>
           </p:cNvPr>
@@ -5129,132 +5047,1263 @@
         </p:nvSpPr>
         <p:spPr>
           <a:xfrm>
-            <a:off x="628651" y="1369219"/>
-            <a:ext cx="8196461" cy="3263504"/>
+            <a:off x="-1" y="0"/>
+            <a:ext cx="8811491" cy="538140"/>
           </a:xfrm>
         </p:spPr>
         <p:txBody>
-          <a:bodyPr/>
-          <a:lstStyle/>
-          <a:p>
-            <a:pPr marL="0" indent="0" algn="l">
+          <a:bodyPr>
+            <a:normAutofit/>
+          </a:bodyPr>
+          <a:lstStyle/>
+          <a:p>
+            <a:pPr marL="0" indent="0">
               <a:buNone/>
             </a:pPr>
             <a:r>
-              <a:rPr lang="en-US" sz="2400" dirty="0">
-                <a:solidFill>
-                  <a:srgbClr val="3F7F5F"/>
-                </a:solidFill>
-                <a:latin typeface="Consolas" panose="020B0609020204030204" pitchFamily="49" charset="0"/>
-              </a:rPr>
-              <a:t>/* Remove the element at the specified index */</a:t>
-            </a:r>
-          </a:p>
-          <a:p>
-            <a:pPr marL="0" indent="0" algn="l">
-              <a:buNone/>
+              <a:rPr lang="en-US" dirty="0"/>
+              <a:t>In the </a:t>
+            </a:r>
+            <a:r>
+              <a:rPr lang="en-US" dirty="0" err="1"/>
+              <a:t>ArrayStringList</a:t>
+            </a:r>
+            <a:r>
+              <a:rPr lang="en-US" dirty="0"/>
+              <a:t> class, we have a private helper method </a:t>
+            </a:r>
+            <a:r>
+              <a:rPr lang="en-US" dirty="0" err="1"/>
+              <a:t>expandCapcity</a:t>
+            </a:r>
+            <a:endParaRPr lang="en-US" dirty="0"/>
+          </a:p>
+        </p:txBody>
+      </p:sp>
+      <p:sp>
+        <p:nvSpPr>
+          <p:cNvPr id="4" name="TextBox 3">
+            <a:extLst>
+              <a:ext uri="{FF2B5EF4-FFF2-40B4-BE49-F238E27FC236}">
+                <a16:creationId xmlns:a16="http://schemas.microsoft.com/office/drawing/2014/main" id="{87CA6D06-DC30-40E2-BCB0-B041D7DAA1D3}"/>
+              </a:ext>
+            </a:extLst>
+          </p:cNvPr>
+          <p:cNvSpPr txBox="1"/>
+          <p:nvPr/>
+        </p:nvSpPr>
+        <p:spPr>
+          <a:xfrm>
+            <a:off x="-1" y="2640933"/>
+            <a:ext cx="8133380" cy="2462213"/>
+          </a:xfrm>
+          <a:prstGeom prst="rect">
+            <a:avLst/>
+          </a:prstGeom>
+          <a:noFill/>
+        </p:spPr>
+        <p:txBody>
+          <a:bodyPr wrap="none" rtlCol="0">
+            <a:spAutoFit/>
+          </a:bodyPr>
+          <a:lstStyle/>
+          <a:p>
+            <a:r>
+              <a:rPr lang="en-US" dirty="0"/>
+              <a:t>If I have a foo function inside the </a:t>
+            </a:r>
+            <a:r>
+              <a:rPr lang="en-US" dirty="0" err="1"/>
+              <a:t>ArrayStringList</a:t>
+            </a:r>
+            <a:r>
+              <a:rPr lang="en-US" dirty="0"/>
+              <a:t> class and have the following code</a:t>
+            </a:r>
+          </a:p>
+          <a:p>
+            <a:r>
+              <a:rPr lang="en-US" dirty="0"/>
+              <a:t>what will be printed out? Assume that the array starts empty and has a capacity of 2.</a:t>
+            </a:r>
+          </a:p>
+          <a:p>
+            <a:endParaRPr lang="en-US" dirty="0"/>
+          </a:p>
+          <a:p>
+            <a:r>
+              <a:rPr lang="en-US" sz="1600" dirty="0">
+                <a:latin typeface="Courier New" panose="02070309020205020404" pitchFamily="49" charset="0"/>
+                <a:cs typeface="Courier New" panose="02070309020205020404" pitchFamily="49" charset="0"/>
+              </a:rPr>
+              <a:t>public void foo(){</a:t>
+            </a:r>
+          </a:p>
+          <a:p>
+            <a:r>
+              <a:rPr lang="en-US" sz="1600" dirty="0">
+                <a:latin typeface="Courier New" panose="02070309020205020404" pitchFamily="49" charset="0"/>
+                <a:cs typeface="Courier New" panose="02070309020205020404" pitchFamily="49" charset="0"/>
+              </a:rPr>
+              <a:t>    String[] </a:t>
+            </a:r>
+            <a:r>
+              <a:rPr lang="en-US" sz="1600" dirty="0" err="1">
+                <a:latin typeface="Courier New" panose="02070309020205020404" pitchFamily="49" charset="0"/>
+                <a:cs typeface="Courier New" panose="02070309020205020404" pitchFamily="49" charset="0"/>
+              </a:rPr>
+              <a:t>tmp</a:t>
+            </a:r>
+            <a:r>
+              <a:rPr lang="en-US" sz="1600" dirty="0">
+                <a:latin typeface="Courier New" panose="02070309020205020404" pitchFamily="49" charset="0"/>
+                <a:cs typeface="Courier New" panose="02070309020205020404" pitchFamily="49" charset="0"/>
+              </a:rPr>
+              <a:t> = elements;</a:t>
+            </a:r>
+          </a:p>
+          <a:p>
+            <a:r>
+              <a:rPr lang="en-US" sz="1600" dirty="0">
+                <a:latin typeface="Courier New" panose="02070309020205020404" pitchFamily="49" charset="0"/>
+                <a:cs typeface="Courier New" panose="02070309020205020404" pitchFamily="49" charset="0"/>
+              </a:rPr>
+              <a:t>    add(“a”); add(“b”); add(“c”);</a:t>
+            </a:r>
+          </a:p>
+          <a:p>
+            <a:r>
+              <a:rPr lang="en-US" sz="1600" dirty="0">
+                <a:latin typeface="Courier New" panose="02070309020205020404" pitchFamily="49" charset="0"/>
+                <a:cs typeface="Courier New" panose="02070309020205020404" pitchFamily="49" charset="0"/>
+              </a:rPr>
+              <a:t>    </a:t>
+            </a:r>
+            <a:r>
+              <a:rPr lang="en-US" sz="1600" dirty="0" err="1">
+                <a:latin typeface="Courier New" panose="02070309020205020404" pitchFamily="49" charset="0"/>
+                <a:cs typeface="Courier New" panose="02070309020205020404" pitchFamily="49" charset="0"/>
+              </a:rPr>
+              <a:t>expandCapacity</a:t>
+            </a:r>
+            <a:r>
+              <a:rPr lang="en-US" sz="1600" dirty="0">
+                <a:latin typeface="Courier New" panose="02070309020205020404" pitchFamily="49" charset="0"/>
+                <a:cs typeface="Courier New" panose="02070309020205020404" pitchFamily="49" charset="0"/>
+              </a:rPr>
+              <a:t>();</a:t>
+            </a:r>
+          </a:p>
+          <a:p>
+            <a:r>
+              <a:rPr lang="en-US" sz="1600" dirty="0">
+                <a:latin typeface="Courier New" panose="02070309020205020404" pitchFamily="49" charset="0"/>
+                <a:cs typeface="Courier New" panose="02070309020205020404" pitchFamily="49" charset="0"/>
+              </a:rPr>
+              <a:t>    </a:t>
+            </a:r>
+            <a:r>
+              <a:rPr lang="en-US" sz="1600" dirty="0" err="1">
+                <a:latin typeface="Courier New" panose="02070309020205020404" pitchFamily="49" charset="0"/>
+                <a:cs typeface="Courier New" panose="02070309020205020404" pitchFamily="49" charset="0"/>
+              </a:rPr>
+              <a:t>System.out.println</a:t>
+            </a:r>
+            <a:r>
+              <a:rPr lang="en-US" sz="1600" dirty="0">
+                <a:latin typeface="Courier New" panose="02070309020205020404" pitchFamily="49" charset="0"/>
+                <a:cs typeface="Courier New" panose="02070309020205020404" pitchFamily="49" charset="0"/>
+              </a:rPr>
+              <a:t>(</a:t>
+            </a:r>
+            <a:r>
+              <a:rPr lang="en-US" sz="1600" dirty="0" err="1">
+                <a:latin typeface="Courier New" panose="02070309020205020404" pitchFamily="49" charset="0"/>
+                <a:cs typeface="Courier New" panose="02070309020205020404" pitchFamily="49" charset="0"/>
+              </a:rPr>
+              <a:t>tmp</a:t>
+            </a:r>
+            <a:r>
+              <a:rPr lang="en-US" sz="1600" dirty="0">
+                <a:latin typeface="Courier New" panose="02070309020205020404" pitchFamily="49" charset="0"/>
+                <a:cs typeface="Courier New" panose="02070309020205020404" pitchFamily="49" charset="0"/>
+              </a:rPr>
+              <a:t> == elements);</a:t>
+            </a:r>
+          </a:p>
+          <a:p>
+            <a:r>
+              <a:rPr lang="en-US" sz="1600" dirty="0">
+                <a:latin typeface="Courier New" panose="02070309020205020404" pitchFamily="49" charset="0"/>
+                <a:cs typeface="Courier New" panose="02070309020205020404" pitchFamily="49" charset="0"/>
+              </a:rPr>
+              <a:t>}</a:t>
+            </a:r>
+          </a:p>
+        </p:txBody>
+      </p:sp>
+      <p:pic>
+        <p:nvPicPr>
+          <p:cNvPr id="2" name="Picture 1">
+            <a:extLst>
+              <a:ext uri="{FF2B5EF4-FFF2-40B4-BE49-F238E27FC236}">
+                <a16:creationId xmlns:a16="http://schemas.microsoft.com/office/drawing/2014/main" id="{1742D77E-102F-4540-ADD3-FA39DF8CC3D4}"/>
+              </a:ext>
+            </a:extLst>
+          </p:cNvPr>
+          <p:cNvPicPr>
+            <a:picLocks noChangeAspect="1"/>
+          </p:cNvPicPr>
+          <p:nvPr/>
+        </p:nvPicPr>
+        <p:blipFill>
+          <a:blip r:embed="rId2"/>
+          <a:stretch>
+            <a:fillRect/>
+          </a:stretch>
+        </p:blipFill>
+        <p:spPr>
+          <a:xfrm>
+            <a:off x="64177" y="390059"/>
+            <a:ext cx="5423968" cy="2141653"/>
+          </a:xfrm>
+          <a:prstGeom prst="rect">
+            <a:avLst/>
+          </a:prstGeom>
+        </p:spPr>
+      </p:pic>
+      <p:sp>
+        <p:nvSpPr>
+          <p:cNvPr id="5" name="TextBox 4">
+            <a:extLst>
+              <a:ext uri="{FF2B5EF4-FFF2-40B4-BE49-F238E27FC236}">
+                <a16:creationId xmlns:a16="http://schemas.microsoft.com/office/drawing/2014/main" id="{60F20BA8-237B-4747-8900-7293665AE541}"/>
+              </a:ext>
+            </a:extLst>
+          </p:cNvPr>
+          <p:cNvSpPr txBox="1"/>
+          <p:nvPr/>
+        </p:nvSpPr>
+        <p:spPr>
+          <a:xfrm>
+            <a:off x="5538478" y="3629568"/>
+            <a:ext cx="3273012" cy="1200329"/>
+          </a:xfrm>
+          <a:prstGeom prst="rect">
+            <a:avLst/>
+          </a:prstGeom>
+          <a:noFill/>
+        </p:spPr>
+        <p:txBody>
+          <a:bodyPr wrap="none" rtlCol="0">
+            <a:spAutoFit/>
+          </a:bodyPr>
+          <a:lstStyle/>
+          <a:p>
+            <a:pPr marL="342900" indent="-342900">
+              <a:buAutoNum type="alphaUcPeriod"/>
             </a:pPr>
             <a:r>
-              <a:rPr lang="en-US" sz="2400" b="1" dirty="0">
-                <a:solidFill>
-                  <a:srgbClr val="7F0055"/>
-                </a:solidFill>
-                <a:latin typeface="Consolas" panose="020B0609020204030204" pitchFamily="49" charset="0"/>
-              </a:rPr>
-              <a:t>void</a:t>
-            </a:r>
-            <a:r>
-              <a:rPr lang="en-US" sz="2400" b="1" dirty="0">
-                <a:solidFill>
-                  <a:srgbClr val="000000"/>
-                </a:solidFill>
-                <a:latin typeface="Consolas" panose="020B0609020204030204" pitchFamily="49" charset="0"/>
-              </a:rPr>
-              <a:t> remove(</a:t>
-            </a:r>
-            <a:r>
-              <a:rPr lang="en-US" sz="2400" b="1" dirty="0">
-                <a:solidFill>
-                  <a:srgbClr val="7F0055"/>
-                </a:solidFill>
-                <a:latin typeface="Consolas" panose="020B0609020204030204" pitchFamily="49" charset="0"/>
-              </a:rPr>
-              <a:t>int</a:t>
-            </a:r>
-            <a:r>
-              <a:rPr lang="en-US" sz="2400" b="1" dirty="0">
-                <a:solidFill>
-                  <a:srgbClr val="000000"/>
-                </a:solidFill>
-                <a:latin typeface="Consolas" panose="020B0609020204030204" pitchFamily="49" charset="0"/>
-              </a:rPr>
-              <a:t> </a:t>
-            </a:r>
-            <a:r>
-              <a:rPr lang="en-US" sz="2400" b="1" dirty="0">
-                <a:solidFill>
-                  <a:srgbClr val="6A3E3E"/>
-                </a:solidFill>
-                <a:latin typeface="Consolas" panose="020B0609020204030204" pitchFamily="49" charset="0"/>
-              </a:rPr>
-              <a:t>index</a:t>
-            </a:r>
-            <a:r>
-              <a:rPr lang="en-US" sz="2400" b="1" dirty="0">
-                <a:solidFill>
-                  <a:srgbClr val="000000"/>
-                </a:solidFill>
-                <a:latin typeface="Consolas" panose="020B0609020204030204" pitchFamily="49" charset="0"/>
-              </a:rPr>
-              <a:t>);</a:t>
-            </a:r>
-          </a:p>
-          <a:p>
-            <a:pPr algn="l"/>
-            <a:endParaRPr lang="en-US" sz="2400" b="1" dirty="0">
-              <a:solidFill>
-                <a:srgbClr val="000000"/>
-              </a:solidFill>
-              <a:latin typeface="Consolas" panose="020B0609020204030204" pitchFamily="49" charset="0"/>
-            </a:endParaRPr>
-          </a:p>
-          <a:p>
-            <a:r>
-              <a:rPr lang="en-US" dirty="0"/>
-              <a:t>Write a test case for the </a:t>
-            </a:r>
-            <a:r>
-              <a:rPr lang="en-US" dirty="0" err="1"/>
-              <a:t>ArrayList</a:t>
-            </a:r>
-            <a:r>
-              <a:rPr lang="en-US" dirty="0"/>
-              <a:t> remove method</a:t>
-            </a:r>
-          </a:p>
-          <a:p>
-            <a:r>
-              <a:rPr lang="en-US" dirty="0"/>
-              <a:t>Implement the </a:t>
-            </a:r>
-            <a:r>
-              <a:rPr lang="en-US" dirty="0" err="1"/>
-              <a:t>ArrayList</a:t>
-            </a:r>
-            <a:r>
-              <a:rPr lang="en-US" dirty="0"/>
-              <a:t> remove method</a:t>
-            </a:r>
-          </a:p>
-          <a:p>
-            <a:endParaRPr lang="en-US" dirty="0"/>
+              <a:rPr lang="en-US" dirty="0"/>
+              <a:t>true</a:t>
+            </a:r>
+          </a:p>
+          <a:p>
+            <a:pPr marL="342900" indent="-342900">
+              <a:buAutoNum type="alphaUcPeriod"/>
+            </a:pPr>
+            <a:r>
+              <a:rPr lang="en-US" dirty="0"/>
+              <a:t>false</a:t>
+            </a:r>
+          </a:p>
+          <a:p>
+            <a:pPr marL="342900" indent="-342900">
+              <a:buAutoNum type="alphaUcPeriod"/>
+            </a:pPr>
+            <a:r>
+              <a:rPr lang="en-US" dirty="0"/>
+              <a:t>there will be a compiler error</a:t>
+            </a:r>
+          </a:p>
+          <a:p>
+            <a:pPr marL="342900" indent="-342900">
+              <a:buAutoNum type="alphaUcPeriod"/>
+            </a:pPr>
+            <a:r>
+              <a:rPr lang="en-US" dirty="0"/>
+              <a:t>there will be a runtime error</a:t>
+            </a:r>
           </a:p>
         </p:txBody>
       </p:sp>
     </p:spTree>
     <p:extLst>
       <p:ext uri="{BB962C8B-B14F-4D97-AF65-F5344CB8AC3E}">
-        <p14:creationId xmlns:p14="http://schemas.microsoft.com/office/powerpoint/2010/main" val="4172965719"/>
+        <p14:creationId xmlns:p14="http://schemas.microsoft.com/office/powerpoint/2010/main" val="2221267245"/>
+      </p:ext>
+    </p:extLst>
+  </p:cSld>
+  <p:clrMapOvr>
+    <a:masterClrMapping/>
+  </p:clrMapOvr>
+</p:sld>
+</file>
+
+<file path=ppt/slides/slide7.xml><?xml version="1.0" encoding="utf-8"?>
+<p:sld xmlns:a="http://schemas.openxmlformats.org/drawingml/2006/main" xmlns:r="http://schemas.openxmlformats.org/officeDocument/2006/relationships" xmlns:p="http://schemas.openxmlformats.org/presentationml/2006/main">
+  <p:cSld>
+    <p:spTree>
+      <p:nvGrpSpPr>
+        <p:cNvPr id="1" name=""/>
+        <p:cNvGrpSpPr/>
+        <p:nvPr/>
+      </p:nvGrpSpPr>
+      <p:grpSpPr>
+        <a:xfrm>
+          <a:off x="0" y="0"/>
+          <a:ext cx="0" cy="0"/>
+          <a:chOff x="0" y="0"/>
+          <a:chExt cx="0" cy="0"/>
+        </a:xfrm>
+      </p:grpSpPr>
+      <p:sp>
+        <p:nvSpPr>
+          <p:cNvPr id="3" name="Content Placeholder 2">
+            <a:extLst>
+              <a:ext uri="{FF2B5EF4-FFF2-40B4-BE49-F238E27FC236}">
+                <a16:creationId xmlns:a16="http://schemas.microsoft.com/office/drawing/2014/main" id="{64462D6F-7A85-458A-93C0-2F829C41FDFF}"/>
+              </a:ext>
+            </a:extLst>
+          </p:cNvPr>
+          <p:cNvSpPr>
+            <a:spLocks noGrp="1"/>
+          </p:cNvSpPr>
+          <p:nvPr>
+            <p:ph idx="1"/>
+          </p:nvPr>
+        </p:nvSpPr>
+        <p:spPr>
+          <a:xfrm>
+            <a:off x="-1" y="0"/>
+            <a:ext cx="8811491" cy="538140"/>
+          </a:xfrm>
+        </p:spPr>
+        <p:txBody>
+          <a:bodyPr>
+            <a:normAutofit/>
+          </a:bodyPr>
+          <a:lstStyle/>
+          <a:p>
+            <a:pPr marL="0" indent="0">
+              <a:buNone/>
+            </a:pPr>
+            <a:r>
+              <a:rPr lang="en-US" dirty="0"/>
+              <a:t>In the </a:t>
+            </a:r>
+            <a:r>
+              <a:rPr lang="en-US" dirty="0" err="1"/>
+              <a:t>ArrayStringList</a:t>
+            </a:r>
+            <a:r>
+              <a:rPr lang="en-US" dirty="0"/>
+              <a:t> class, we have a private helper method </a:t>
+            </a:r>
+            <a:r>
+              <a:rPr lang="en-US" dirty="0" err="1"/>
+              <a:t>expandCapcity</a:t>
+            </a:r>
+            <a:endParaRPr lang="en-US" dirty="0"/>
+          </a:p>
+        </p:txBody>
+      </p:sp>
+      <p:sp>
+        <p:nvSpPr>
+          <p:cNvPr id="4" name="TextBox 3">
+            <a:extLst>
+              <a:ext uri="{FF2B5EF4-FFF2-40B4-BE49-F238E27FC236}">
+                <a16:creationId xmlns:a16="http://schemas.microsoft.com/office/drawing/2014/main" id="{87CA6D06-DC30-40E2-BCB0-B041D7DAA1D3}"/>
+              </a:ext>
+            </a:extLst>
+          </p:cNvPr>
+          <p:cNvSpPr txBox="1"/>
+          <p:nvPr/>
+        </p:nvSpPr>
+        <p:spPr>
+          <a:xfrm>
+            <a:off x="-1" y="2640933"/>
+            <a:ext cx="5176802" cy="1754326"/>
+          </a:xfrm>
+          <a:prstGeom prst="rect">
+            <a:avLst/>
+          </a:prstGeom>
+          <a:noFill/>
+        </p:spPr>
+        <p:txBody>
+          <a:bodyPr wrap="none" rtlCol="0">
+            <a:spAutoFit/>
+          </a:bodyPr>
+          <a:lstStyle/>
+          <a:p>
+            <a:r>
+              <a:rPr lang="en-US" dirty="0"/>
+              <a:t>When do I need to call this </a:t>
+            </a:r>
+            <a:r>
+              <a:rPr lang="en-US" dirty="0" err="1"/>
+              <a:t>expandCapacity</a:t>
+            </a:r>
+            <a:r>
+              <a:rPr lang="en-US" dirty="0"/>
+              <a:t> function?</a:t>
+            </a:r>
+          </a:p>
+          <a:p>
+            <a:pPr indent="-342900">
+              <a:buAutoNum type="alphaUcPeriod"/>
+            </a:pPr>
+            <a:r>
+              <a:rPr lang="en-US" dirty="0"/>
+              <a:t>Inside the constructors</a:t>
+            </a:r>
+          </a:p>
+          <a:p>
+            <a:pPr indent="-342900">
+              <a:buAutoNum type="alphaUcPeriod"/>
+            </a:pPr>
+            <a:r>
+              <a:rPr lang="en-US" dirty="0"/>
+              <a:t>Inside the insert method</a:t>
+            </a:r>
+          </a:p>
+          <a:p>
+            <a:pPr indent="-342900">
+              <a:buAutoNum type="alphaUcPeriod"/>
+            </a:pPr>
+            <a:r>
+              <a:rPr lang="en-US" dirty="0"/>
+              <a:t>Inside the remove method</a:t>
+            </a:r>
+          </a:p>
+          <a:p>
+            <a:pPr indent="-342900">
+              <a:buAutoNum type="alphaUcPeriod"/>
+            </a:pPr>
+            <a:r>
+              <a:rPr lang="en-US" dirty="0"/>
+              <a:t>Inside the get method</a:t>
+            </a:r>
+          </a:p>
+          <a:p>
+            <a:pPr indent="-342900">
+              <a:buAutoNum type="alphaUcPeriod"/>
+            </a:pPr>
+            <a:r>
+              <a:rPr lang="en-US" dirty="0"/>
+              <a:t>Inside the add method</a:t>
+            </a:r>
+          </a:p>
+        </p:txBody>
+      </p:sp>
+      <p:pic>
+        <p:nvPicPr>
+          <p:cNvPr id="2" name="Picture 1">
+            <a:extLst>
+              <a:ext uri="{FF2B5EF4-FFF2-40B4-BE49-F238E27FC236}">
+                <a16:creationId xmlns:a16="http://schemas.microsoft.com/office/drawing/2014/main" id="{1742D77E-102F-4540-ADD3-FA39DF8CC3D4}"/>
+              </a:ext>
+            </a:extLst>
+          </p:cNvPr>
+          <p:cNvPicPr>
+            <a:picLocks noChangeAspect="1"/>
+          </p:cNvPicPr>
+          <p:nvPr/>
+        </p:nvPicPr>
+        <p:blipFill>
+          <a:blip r:embed="rId2"/>
+          <a:stretch>
+            <a:fillRect/>
+          </a:stretch>
+        </p:blipFill>
+        <p:spPr>
+          <a:xfrm>
+            <a:off x="64177" y="386416"/>
+            <a:ext cx="5423968" cy="2141653"/>
+          </a:xfrm>
+          <a:prstGeom prst="rect">
+            <a:avLst/>
+          </a:prstGeom>
+        </p:spPr>
+      </p:pic>
+    </p:spTree>
+    <p:extLst>
+      <p:ext uri="{BB962C8B-B14F-4D97-AF65-F5344CB8AC3E}">
+        <p14:creationId xmlns:p14="http://schemas.microsoft.com/office/powerpoint/2010/main" val="3952679303"/>
+      </p:ext>
+    </p:extLst>
+  </p:cSld>
+  <p:clrMapOvr>
+    <a:masterClrMapping/>
+  </p:clrMapOvr>
+</p:sld>
+</file>
+
+<file path=ppt/slides/slide8.xml><?xml version="1.0" encoding="utf-8"?>
+<p:sld xmlns:a="http://schemas.openxmlformats.org/drawingml/2006/main" xmlns:r="http://schemas.openxmlformats.org/officeDocument/2006/relationships" xmlns:p="http://schemas.openxmlformats.org/presentationml/2006/main">
+  <p:cSld>
+    <p:spTree>
+      <p:nvGrpSpPr>
+        <p:cNvPr id="1" name=""/>
+        <p:cNvGrpSpPr/>
+        <p:nvPr/>
+      </p:nvGrpSpPr>
+      <p:grpSpPr>
+        <a:xfrm>
+          <a:off x="0" y="0"/>
+          <a:ext cx="0" cy="0"/>
+          <a:chOff x="0" y="0"/>
+          <a:chExt cx="0" cy="0"/>
+        </a:xfrm>
+      </p:grpSpPr>
+      <p:sp>
+        <p:nvSpPr>
+          <p:cNvPr id="3" name="Content Placeholder 2">
+            <a:extLst>
+              <a:ext uri="{FF2B5EF4-FFF2-40B4-BE49-F238E27FC236}">
+                <a16:creationId xmlns:a16="http://schemas.microsoft.com/office/drawing/2014/main" id="{3001AC01-F6D9-4B86-B836-4179D0FC2084}"/>
+              </a:ext>
+            </a:extLst>
+          </p:cNvPr>
+          <p:cNvSpPr>
+            <a:spLocks noGrp="1"/>
+          </p:cNvSpPr>
+          <p:nvPr>
+            <p:ph idx="1"/>
+          </p:nvPr>
+        </p:nvSpPr>
+        <p:spPr>
+          <a:xfrm>
+            <a:off x="301550" y="1962997"/>
+            <a:ext cx="7886700" cy="3263504"/>
+          </a:xfrm>
+        </p:spPr>
+        <p:txBody>
+          <a:bodyPr>
+            <a:normAutofit fontScale="92500" lnSpcReduction="10000"/>
+          </a:bodyPr>
+          <a:lstStyle/>
+          <a:p>
+            <a:pPr marL="0" indent="0">
+              <a:buNone/>
+            </a:pPr>
+            <a:r>
+              <a:rPr lang="en-US" dirty="0"/>
+              <a:t>In our tester for add, we wrote the code for inserting two elements and test if we added properly. Can I write my tester as</a:t>
+            </a:r>
+          </a:p>
+          <a:p>
+            <a:pPr marL="0" indent="0">
+              <a:buNone/>
+            </a:pPr>
+            <a:r>
+              <a:rPr lang="en-US" dirty="0" err="1"/>
+              <a:t>assertEquals</a:t>
+            </a:r>
+            <a:r>
+              <a:rPr lang="en-US" dirty="0"/>
+              <a:t>(</a:t>
+            </a:r>
+            <a:r>
+              <a:rPr lang="en-US" dirty="0" err="1"/>
+              <a:t>slist.get</a:t>
+            </a:r>
+            <a:r>
+              <a:rPr lang="en-US" dirty="0"/>
+              <a:t>(0), “paul”);</a:t>
+            </a:r>
+          </a:p>
+          <a:p>
+            <a:pPr marL="0" indent="0">
+              <a:buNone/>
+            </a:pPr>
+            <a:r>
+              <a:rPr lang="en-US" dirty="0" err="1"/>
+              <a:t>assertEquals</a:t>
+            </a:r>
+            <a:r>
+              <a:rPr lang="en-US" dirty="0"/>
+              <a:t>(</a:t>
+            </a:r>
+            <a:r>
+              <a:rPr lang="en-US" dirty="0" err="1"/>
+              <a:t>slist.get</a:t>
+            </a:r>
+            <a:r>
+              <a:rPr lang="en-US" dirty="0"/>
+              <a:t>(1), “</a:t>
+            </a:r>
+            <a:r>
+              <a:rPr lang="en-US" dirty="0" err="1"/>
+              <a:t>greg</a:t>
+            </a:r>
+            <a:r>
+              <a:rPr lang="en-US" dirty="0"/>
+              <a:t>”);</a:t>
+            </a:r>
+          </a:p>
+          <a:p>
+            <a:pPr marL="0" indent="0">
+              <a:buNone/>
+            </a:pPr>
+            <a:endParaRPr lang="en-US" dirty="0"/>
+          </a:p>
+          <a:p>
+            <a:pPr marL="457200" indent="-457200">
+              <a:buAutoNum type="alphaUcPeriod"/>
+            </a:pPr>
+            <a:r>
+              <a:rPr lang="en-US" dirty="0"/>
+              <a:t>Yes they are basically the same as what we wrote in pre-lecture video</a:t>
+            </a:r>
+          </a:p>
+          <a:p>
+            <a:pPr marL="457200" indent="-457200">
+              <a:buAutoNum type="alphaUcPeriod"/>
+            </a:pPr>
+            <a:r>
+              <a:rPr lang="en-US" dirty="0"/>
+              <a:t>No you can’t switch the order as it will generate the wrong test result</a:t>
+            </a:r>
+          </a:p>
+          <a:p>
+            <a:pPr marL="457200" indent="-457200">
+              <a:buAutoNum type="alphaUcPeriod"/>
+            </a:pPr>
+            <a:r>
+              <a:rPr lang="en-US" dirty="0"/>
+              <a:t>No you can’t switch the order as it makes the interpretation of the test result inaccurate</a:t>
+            </a:r>
+          </a:p>
+        </p:txBody>
+      </p:sp>
+      <p:pic>
+        <p:nvPicPr>
+          <p:cNvPr id="6" name="Picture 5">
+            <a:extLst>
+              <a:ext uri="{FF2B5EF4-FFF2-40B4-BE49-F238E27FC236}">
+                <a16:creationId xmlns:a16="http://schemas.microsoft.com/office/drawing/2014/main" id="{D3C6F176-31D4-495C-8D79-71A5FEBED389}"/>
+              </a:ext>
+            </a:extLst>
+          </p:cNvPr>
+          <p:cNvPicPr>
+            <a:picLocks noChangeAspect="1"/>
+          </p:cNvPicPr>
+          <p:nvPr/>
+        </p:nvPicPr>
+        <p:blipFill>
+          <a:blip r:embed="rId2"/>
+          <a:stretch>
+            <a:fillRect/>
+          </a:stretch>
+        </p:blipFill>
+        <p:spPr>
+          <a:xfrm>
+            <a:off x="0" y="0"/>
+            <a:ext cx="4073096" cy="1548752"/>
+          </a:xfrm>
+          <a:prstGeom prst="rect">
+            <a:avLst/>
+          </a:prstGeom>
+        </p:spPr>
+      </p:pic>
+    </p:spTree>
+    <p:extLst>
+      <p:ext uri="{BB962C8B-B14F-4D97-AF65-F5344CB8AC3E}">
+        <p14:creationId xmlns:p14="http://schemas.microsoft.com/office/powerpoint/2010/main" val="878209463"/>
+      </p:ext>
+    </p:extLst>
+  </p:cSld>
+  <p:clrMapOvr>
+    <a:masterClrMapping/>
+  </p:clrMapOvr>
+</p:sld>
+</file>
+
+<file path=ppt/slides/slide9.xml><?xml version="1.0" encoding="utf-8"?>
+<p:sld xmlns:a="http://schemas.openxmlformats.org/drawingml/2006/main" xmlns:r="http://schemas.openxmlformats.org/officeDocument/2006/relationships" xmlns:p="http://schemas.openxmlformats.org/presentationml/2006/main">
+  <p:cSld>
+    <p:spTree>
+      <p:nvGrpSpPr>
+        <p:cNvPr id="1" name=""/>
+        <p:cNvGrpSpPr/>
+        <p:nvPr/>
+      </p:nvGrpSpPr>
+      <p:grpSpPr>
+        <a:xfrm>
+          <a:off x="0" y="0"/>
+          <a:ext cx="0" cy="0"/>
+          <a:chOff x="0" y="0"/>
+          <a:chExt cx="0" cy="0"/>
+        </a:xfrm>
+      </p:grpSpPr>
+      <p:sp>
+        <p:nvSpPr>
+          <p:cNvPr id="2" name="Title 1">
+            <a:extLst>
+              <a:ext uri="{FF2B5EF4-FFF2-40B4-BE49-F238E27FC236}">
+                <a16:creationId xmlns:a16="http://schemas.microsoft.com/office/drawing/2014/main" id="{667F14FE-46DC-4C67-A4A6-058A50EB9355}"/>
+              </a:ext>
+            </a:extLst>
+          </p:cNvPr>
+          <p:cNvSpPr>
+            <a:spLocks noGrp="1"/>
+          </p:cNvSpPr>
+          <p:nvPr>
+            <p:ph type="title"/>
+          </p:nvPr>
+        </p:nvSpPr>
+        <p:spPr/>
+        <p:txBody>
+          <a:bodyPr/>
+          <a:lstStyle/>
+          <a:p>
+            <a:r>
+              <a:rPr lang="en-US" dirty="0" err="1"/>
+              <a:t>StringList</a:t>
+            </a:r>
+            <a:r>
+              <a:rPr lang="en-US" dirty="0"/>
+              <a:t> Interface</a:t>
+            </a:r>
+          </a:p>
+        </p:txBody>
+      </p:sp>
+      <p:sp>
+        <p:nvSpPr>
+          <p:cNvPr id="7" name="TextBox 6">
+            <a:extLst>
+              <a:ext uri="{FF2B5EF4-FFF2-40B4-BE49-F238E27FC236}">
+                <a16:creationId xmlns:a16="http://schemas.microsoft.com/office/drawing/2014/main" id="{5E087A33-8FB7-4030-9303-6480F6F9ABEE}"/>
+              </a:ext>
+            </a:extLst>
+          </p:cNvPr>
+          <p:cNvSpPr txBox="1"/>
+          <p:nvPr/>
+        </p:nvSpPr>
+        <p:spPr>
+          <a:xfrm>
+            <a:off x="628648" y="1019351"/>
+            <a:ext cx="6493010" cy="3970318"/>
+          </a:xfrm>
+          <a:prstGeom prst="rect">
+            <a:avLst/>
+          </a:prstGeom>
+          <a:noFill/>
+        </p:spPr>
+        <p:txBody>
+          <a:bodyPr wrap="square">
+            <a:spAutoFit/>
+          </a:bodyPr>
+          <a:lstStyle/>
+          <a:p>
+            <a:pPr algn="l"/>
+            <a:r>
+              <a:rPr lang="en-US" sz="1400" b="1" dirty="0">
+                <a:solidFill>
+                  <a:srgbClr val="7F0055"/>
+                </a:solidFill>
+                <a:latin typeface="Consolas" panose="020B0609020204030204" pitchFamily="49" charset="0"/>
+              </a:rPr>
+              <a:t>public</a:t>
+            </a:r>
+            <a:r>
+              <a:rPr lang="en-US" sz="1400" b="1" dirty="0">
+                <a:solidFill>
+                  <a:srgbClr val="000000"/>
+                </a:solidFill>
+                <a:latin typeface="Consolas" panose="020B0609020204030204" pitchFamily="49" charset="0"/>
+              </a:rPr>
+              <a:t> </a:t>
+            </a:r>
+            <a:r>
+              <a:rPr lang="en-US" sz="1400" b="1" dirty="0">
+                <a:solidFill>
+                  <a:srgbClr val="7F0055"/>
+                </a:solidFill>
+                <a:latin typeface="Consolas" panose="020B0609020204030204" pitchFamily="49" charset="0"/>
+              </a:rPr>
+              <a:t>interface</a:t>
+            </a:r>
+            <a:r>
+              <a:rPr lang="en-US" sz="1400" b="1" dirty="0">
+                <a:solidFill>
+                  <a:srgbClr val="000000"/>
+                </a:solidFill>
+                <a:latin typeface="Consolas" panose="020B0609020204030204" pitchFamily="49" charset="0"/>
+              </a:rPr>
+              <a:t> </a:t>
+            </a:r>
+            <a:r>
+              <a:rPr lang="en-US" sz="1400" b="1" dirty="0" err="1">
+                <a:solidFill>
+                  <a:srgbClr val="000000"/>
+                </a:solidFill>
+                <a:latin typeface="Consolas" panose="020B0609020204030204" pitchFamily="49" charset="0"/>
+              </a:rPr>
+              <a:t>StringList</a:t>
+            </a:r>
+            <a:r>
+              <a:rPr lang="en-US" sz="1400" b="1" dirty="0">
+                <a:solidFill>
+                  <a:srgbClr val="000000"/>
+                </a:solidFill>
+                <a:latin typeface="Consolas" panose="020B0609020204030204" pitchFamily="49" charset="0"/>
+              </a:rPr>
+              <a:t> {</a:t>
+            </a:r>
+          </a:p>
+          <a:p>
+            <a:pPr algn="l"/>
+            <a:endParaRPr lang="en-US" sz="1400" dirty="0">
+              <a:latin typeface="Consolas" panose="020B0609020204030204" pitchFamily="49" charset="0"/>
+            </a:endParaRPr>
+          </a:p>
+          <a:p>
+            <a:pPr algn="l"/>
+            <a:r>
+              <a:rPr lang="en-US" sz="1400" dirty="0">
+                <a:solidFill>
+                  <a:srgbClr val="000000"/>
+                </a:solidFill>
+                <a:latin typeface="Consolas" panose="020B0609020204030204" pitchFamily="49" charset="0"/>
+              </a:rPr>
+              <a:t>  </a:t>
+            </a:r>
+            <a:r>
+              <a:rPr lang="en-US" sz="1400" dirty="0">
+                <a:solidFill>
+                  <a:srgbClr val="3F7F5F"/>
+                </a:solidFill>
+                <a:latin typeface="Consolas" panose="020B0609020204030204" pitchFamily="49" charset="0"/>
+              </a:rPr>
+              <a:t>/* Add an element at the end of the list */</a:t>
+            </a:r>
+          </a:p>
+          <a:p>
+            <a:pPr algn="l"/>
+            <a:r>
+              <a:rPr lang="en-US" sz="1400" dirty="0">
+                <a:solidFill>
+                  <a:srgbClr val="000000"/>
+                </a:solidFill>
+                <a:latin typeface="Consolas" panose="020B0609020204030204" pitchFamily="49" charset="0"/>
+              </a:rPr>
+              <a:t>  </a:t>
+            </a:r>
+            <a:r>
+              <a:rPr lang="en-US" sz="1400" b="1" dirty="0">
+                <a:solidFill>
+                  <a:srgbClr val="7F0055"/>
+                </a:solidFill>
+                <a:latin typeface="Consolas" panose="020B0609020204030204" pitchFamily="49" charset="0"/>
+              </a:rPr>
+              <a:t>void</a:t>
+            </a:r>
+            <a:r>
+              <a:rPr lang="en-US" sz="1400" b="1" dirty="0">
+                <a:solidFill>
+                  <a:srgbClr val="000000"/>
+                </a:solidFill>
+                <a:latin typeface="Consolas" panose="020B0609020204030204" pitchFamily="49" charset="0"/>
+              </a:rPr>
+              <a:t> add(String </a:t>
+            </a:r>
+            <a:r>
+              <a:rPr lang="en-US" sz="1400" b="1" dirty="0">
+                <a:solidFill>
+                  <a:srgbClr val="6A3E3E"/>
+                </a:solidFill>
+                <a:latin typeface="Consolas" panose="020B0609020204030204" pitchFamily="49" charset="0"/>
+              </a:rPr>
+              <a:t>s</a:t>
+            </a:r>
+            <a:r>
+              <a:rPr lang="en-US" sz="1400" b="1" dirty="0">
+                <a:solidFill>
+                  <a:srgbClr val="000000"/>
+                </a:solidFill>
+                <a:latin typeface="Consolas" panose="020B0609020204030204" pitchFamily="49" charset="0"/>
+              </a:rPr>
+              <a:t>);</a:t>
+            </a:r>
+          </a:p>
+          <a:p>
+            <a:pPr algn="l"/>
+            <a:endParaRPr lang="en-US" sz="1400" dirty="0">
+              <a:latin typeface="Consolas" panose="020B0609020204030204" pitchFamily="49" charset="0"/>
+            </a:endParaRPr>
+          </a:p>
+          <a:p>
+            <a:pPr algn="l"/>
+            <a:r>
+              <a:rPr lang="en-US" sz="1400" dirty="0">
+                <a:solidFill>
+                  <a:srgbClr val="000000"/>
+                </a:solidFill>
+                <a:latin typeface="Consolas" panose="020B0609020204030204" pitchFamily="49" charset="0"/>
+              </a:rPr>
+              <a:t>  </a:t>
+            </a:r>
+            <a:r>
+              <a:rPr lang="en-US" sz="1400" dirty="0">
+                <a:solidFill>
+                  <a:srgbClr val="3F7F5F"/>
+                </a:solidFill>
+                <a:latin typeface="Consolas" panose="020B0609020204030204" pitchFamily="49" charset="0"/>
+              </a:rPr>
+              <a:t>/* Get the element at the given index */</a:t>
+            </a:r>
+          </a:p>
+          <a:p>
+            <a:pPr algn="l"/>
+            <a:r>
+              <a:rPr lang="en-US" sz="1400" dirty="0">
+                <a:solidFill>
+                  <a:srgbClr val="000000"/>
+                </a:solidFill>
+                <a:latin typeface="Consolas" panose="020B0609020204030204" pitchFamily="49" charset="0"/>
+              </a:rPr>
+              <a:t>  String get(</a:t>
+            </a:r>
+            <a:r>
+              <a:rPr lang="en-US" sz="1400" b="1" dirty="0">
+                <a:solidFill>
+                  <a:srgbClr val="7F0055"/>
+                </a:solidFill>
+                <a:latin typeface="Consolas" panose="020B0609020204030204" pitchFamily="49" charset="0"/>
+              </a:rPr>
+              <a:t>int</a:t>
+            </a:r>
+            <a:r>
+              <a:rPr lang="en-US" sz="1400" b="1" dirty="0">
+                <a:solidFill>
+                  <a:srgbClr val="000000"/>
+                </a:solidFill>
+                <a:latin typeface="Consolas" panose="020B0609020204030204" pitchFamily="49" charset="0"/>
+              </a:rPr>
+              <a:t> </a:t>
+            </a:r>
+            <a:r>
+              <a:rPr lang="en-US" sz="1400" b="1" dirty="0">
+                <a:solidFill>
+                  <a:srgbClr val="6A3E3E"/>
+                </a:solidFill>
+                <a:latin typeface="Consolas" panose="020B0609020204030204" pitchFamily="49" charset="0"/>
+              </a:rPr>
+              <a:t>index</a:t>
+            </a:r>
+            <a:r>
+              <a:rPr lang="en-US" sz="1400" b="1" dirty="0">
+                <a:solidFill>
+                  <a:srgbClr val="000000"/>
+                </a:solidFill>
+                <a:latin typeface="Consolas" panose="020B0609020204030204" pitchFamily="49" charset="0"/>
+              </a:rPr>
+              <a:t>);</a:t>
+            </a:r>
+          </a:p>
+          <a:p>
+            <a:pPr algn="l"/>
+            <a:endParaRPr lang="en-US" sz="1400" dirty="0">
+              <a:latin typeface="Consolas" panose="020B0609020204030204" pitchFamily="49" charset="0"/>
+            </a:endParaRPr>
+          </a:p>
+          <a:p>
+            <a:pPr algn="l"/>
+            <a:r>
+              <a:rPr lang="en-US" sz="1400" dirty="0">
+                <a:solidFill>
+                  <a:srgbClr val="000000"/>
+                </a:solidFill>
+                <a:latin typeface="Consolas" panose="020B0609020204030204" pitchFamily="49" charset="0"/>
+              </a:rPr>
+              <a:t>  </a:t>
+            </a:r>
+            <a:r>
+              <a:rPr lang="en-US" sz="1400" dirty="0">
+                <a:solidFill>
+                  <a:srgbClr val="3F7F5F"/>
+                </a:solidFill>
+                <a:latin typeface="Consolas" panose="020B0609020204030204" pitchFamily="49" charset="0"/>
+              </a:rPr>
+              <a:t>/* Get the number of elements in the list */</a:t>
+            </a:r>
+          </a:p>
+          <a:p>
+            <a:pPr algn="l"/>
+            <a:r>
+              <a:rPr lang="en-US" sz="1400" dirty="0">
+                <a:solidFill>
+                  <a:srgbClr val="000000"/>
+                </a:solidFill>
+                <a:latin typeface="Consolas" panose="020B0609020204030204" pitchFamily="49" charset="0"/>
+              </a:rPr>
+              <a:t>  </a:t>
+            </a:r>
+            <a:r>
+              <a:rPr lang="en-US" sz="1400" b="1" dirty="0">
+                <a:solidFill>
+                  <a:srgbClr val="7F0055"/>
+                </a:solidFill>
+                <a:latin typeface="Consolas" panose="020B0609020204030204" pitchFamily="49" charset="0"/>
+              </a:rPr>
+              <a:t>int</a:t>
+            </a:r>
+            <a:r>
+              <a:rPr lang="en-US" sz="1400" b="1" dirty="0">
+                <a:solidFill>
+                  <a:srgbClr val="000000"/>
+                </a:solidFill>
+                <a:latin typeface="Consolas" panose="020B0609020204030204" pitchFamily="49" charset="0"/>
+              </a:rPr>
+              <a:t> size();</a:t>
+            </a:r>
+          </a:p>
+          <a:p>
+            <a:pPr algn="l"/>
+            <a:endParaRPr lang="en-US" sz="1400" dirty="0">
+              <a:latin typeface="Consolas" panose="020B0609020204030204" pitchFamily="49" charset="0"/>
+            </a:endParaRPr>
+          </a:p>
+          <a:p>
+            <a:pPr algn="l"/>
+            <a:r>
+              <a:rPr lang="en-US" sz="1400" dirty="0">
+                <a:solidFill>
+                  <a:srgbClr val="000000"/>
+                </a:solidFill>
+                <a:latin typeface="Consolas" panose="020B0609020204030204" pitchFamily="49" charset="0"/>
+              </a:rPr>
+              <a:t>  </a:t>
+            </a:r>
+            <a:r>
+              <a:rPr lang="en-US" sz="1400" dirty="0">
+                <a:solidFill>
+                  <a:srgbClr val="3F7F5F"/>
+                </a:solidFill>
+                <a:latin typeface="Consolas" panose="020B0609020204030204" pitchFamily="49" charset="0"/>
+              </a:rPr>
+              <a:t>/* Add an element at the specified index */</a:t>
+            </a:r>
+          </a:p>
+          <a:p>
+            <a:pPr algn="l"/>
+            <a:r>
+              <a:rPr lang="en-US" sz="1400" dirty="0">
+                <a:solidFill>
+                  <a:srgbClr val="000000"/>
+                </a:solidFill>
+                <a:latin typeface="Consolas" panose="020B0609020204030204" pitchFamily="49" charset="0"/>
+              </a:rPr>
+              <a:t>  </a:t>
+            </a:r>
+            <a:r>
+              <a:rPr lang="en-US" sz="1400" b="1" dirty="0">
+                <a:solidFill>
+                  <a:srgbClr val="7F0055"/>
+                </a:solidFill>
+                <a:latin typeface="Consolas" panose="020B0609020204030204" pitchFamily="49" charset="0"/>
+              </a:rPr>
+              <a:t>void</a:t>
+            </a:r>
+            <a:r>
+              <a:rPr lang="en-US" sz="1400" b="1" dirty="0">
+                <a:solidFill>
+                  <a:srgbClr val="000000"/>
+                </a:solidFill>
+                <a:latin typeface="Consolas" panose="020B0609020204030204" pitchFamily="49" charset="0"/>
+              </a:rPr>
+              <a:t> insert(</a:t>
+            </a:r>
+            <a:r>
+              <a:rPr lang="en-US" sz="1400" b="1" dirty="0">
+                <a:solidFill>
+                  <a:srgbClr val="7F0055"/>
+                </a:solidFill>
+                <a:latin typeface="Consolas" panose="020B0609020204030204" pitchFamily="49" charset="0"/>
+              </a:rPr>
+              <a:t>int</a:t>
+            </a:r>
+            <a:r>
+              <a:rPr lang="en-US" sz="1400" b="1" dirty="0">
+                <a:solidFill>
+                  <a:srgbClr val="000000"/>
+                </a:solidFill>
+                <a:latin typeface="Consolas" panose="020B0609020204030204" pitchFamily="49" charset="0"/>
+              </a:rPr>
+              <a:t> </a:t>
+            </a:r>
+            <a:r>
+              <a:rPr lang="en-US" sz="1400" b="1" dirty="0">
+                <a:solidFill>
+                  <a:srgbClr val="6A3E3E"/>
+                </a:solidFill>
+                <a:latin typeface="Consolas" panose="020B0609020204030204" pitchFamily="49" charset="0"/>
+              </a:rPr>
+              <a:t>index</a:t>
+            </a:r>
+            <a:r>
+              <a:rPr lang="en-US" sz="1400" b="1" dirty="0">
+                <a:solidFill>
+                  <a:srgbClr val="000000"/>
+                </a:solidFill>
+                <a:latin typeface="Consolas" panose="020B0609020204030204" pitchFamily="49" charset="0"/>
+              </a:rPr>
+              <a:t>, String </a:t>
+            </a:r>
+            <a:r>
+              <a:rPr lang="en-US" sz="1400" b="1" dirty="0">
+                <a:solidFill>
+                  <a:srgbClr val="6A3E3E"/>
+                </a:solidFill>
+                <a:latin typeface="Consolas" panose="020B0609020204030204" pitchFamily="49" charset="0"/>
+              </a:rPr>
+              <a:t>s</a:t>
+            </a:r>
+            <a:r>
+              <a:rPr lang="en-US" sz="1400" b="1" dirty="0">
+                <a:solidFill>
+                  <a:srgbClr val="000000"/>
+                </a:solidFill>
+                <a:latin typeface="Consolas" panose="020B0609020204030204" pitchFamily="49" charset="0"/>
+              </a:rPr>
+              <a:t>);</a:t>
+            </a:r>
+          </a:p>
+          <a:p>
+            <a:pPr algn="l"/>
+            <a:endParaRPr lang="en-US" sz="1400" dirty="0">
+              <a:latin typeface="Consolas" panose="020B0609020204030204" pitchFamily="49" charset="0"/>
+            </a:endParaRPr>
+          </a:p>
+          <a:p>
+            <a:pPr algn="l"/>
+            <a:r>
+              <a:rPr lang="en-US" sz="1400" dirty="0">
+                <a:solidFill>
+                  <a:srgbClr val="000000"/>
+                </a:solidFill>
+                <a:latin typeface="Consolas" panose="020B0609020204030204" pitchFamily="49" charset="0"/>
+              </a:rPr>
+              <a:t>  </a:t>
+            </a:r>
+            <a:r>
+              <a:rPr lang="en-US" sz="1400" dirty="0">
+                <a:solidFill>
+                  <a:srgbClr val="3F7F5F"/>
+                </a:solidFill>
+                <a:latin typeface="Consolas" panose="020B0609020204030204" pitchFamily="49" charset="0"/>
+              </a:rPr>
+              <a:t>/* Remove the element at the specified index */</a:t>
+            </a:r>
+          </a:p>
+          <a:p>
+            <a:pPr algn="l"/>
+            <a:r>
+              <a:rPr lang="en-US" sz="1400" dirty="0">
+                <a:solidFill>
+                  <a:srgbClr val="000000"/>
+                </a:solidFill>
+                <a:latin typeface="Consolas" panose="020B0609020204030204" pitchFamily="49" charset="0"/>
+              </a:rPr>
+              <a:t>  </a:t>
+            </a:r>
+            <a:r>
+              <a:rPr lang="en-US" sz="1400" b="1" dirty="0">
+                <a:solidFill>
+                  <a:srgbClr val="7F0055"/>
+                </a:solidFill>
+                <a:latin typeface="Consolas" panose="020B0609020204030204" pitchFamily="49" charset="0"/>
+              </a:rPr>
+              <a:t>void</a:t>
+            </a:r>
+            <a:r>
+              <a:rPr lang="en-US" sz="1400" b="1" dirty="0">
+                <a:solidFill>
+                  <a:srgbClr val="000000"/>
+                </a:solidFill>
+                <a:latin typeface="Consolas" panose="020B0609020204030204" pitchFamily="49" charset="0"/>
+              </a:rPr>
+              <a:t> remove(</a:t>
+            </a:r>
+            <a:r>
+              <a:rPr lang="en-US" sz="1400" b="1" dirty="0">
+                <a:solidFill>
+                  <a:srgbClr val="7F0055"/>
+                </a:solidFill>
+                <a:latin typeface="Consolas" panose="020B0609020204030204" pitchFamily="49" charset="0"/>
+              </a:rPr>
+              <a:t>int</a:t>
+            </a:r>
+            <a:r>
+              <a:rPr lang="en-US" sz="1400" b="1" dirty="0">
+                <a:solidFill>
+                  <a:srgbClr val="000000"/>
+                </a:solidFill>
+                <a:latin typeface="Consolas" panose="020B0609020204030204" pitchFamily="49" charset="0"/>
+              </a:rPr>
+              <a:t> </a:t>
+            </a:r>
+            <a:r>
+              <a:rPr lang="en-US" sz="1400" b="1" dirty="0">
+                <a:solidFill>
+                  <a:srgbClr val="6A3E3E"/>
+                </a:solidFill>
+                <a:latin typeface="Consolas" panose="020B0609020204030204" pitchFamily="49" charset="0"/>
+              </a:rPr>
+              <a:t>index</a:t>
+            </a:r>
+            <a:r>
+              <a:rPr lang="en-US" sz="1400" b="1" dirty="0">
+                <a:solidFill>
+                  <a:srgbClr val="000000"/>
+                </a:solidFill>
+                <a:latin typeface="Consolas" panose="020B0609020204030204" pitchFamily="49" charset="0"/>
+              </a:rPr>
+              <a:t>);</a:t>
+            </a:r>
+          </a:p>
+          <a:p>
+            <a:pPr algn="l"/>
+            <a:r>
+              <a:rPr lang="en-US" sz="1400" dirty="0">
+                <a:solidFill>
+                  <a:srgbClr val="000000"/>
+                </a:solidFill>
+                <a:latin typeface="Consolas" panose="020B0609020204030204" pitchFamily="49" charset="0"/>
+              </a:rPr>
+              <a:t>  </a:t>
+            </a:r>
+          </a:p>
+          <a:p>
+            <a:pPr algn="l"/>
+            <a:r>
+              <a:rPr lang="en-US" sz="1400" dirty="0">
+                <a:solidFill>
+                  <a:srgbClr val="000000"/>
+                </a:solidFill>
+                <a:latin typeface="Consolas" panose="020B0609020204030204" pitchFamily="49" charset="0"/>
+              </a:rPr>
+              <a:t>}</a:t>
+            </a:r>
+          </a:p>
+        </p:txBody>
+      </p:sp>
+    </p:spTree>
+    <p:extLst>
+      <p:ext uri="{BB962C8B-B14F-4D97-AF65-F5344CB8AC3E}">
+        <p14:creationId xmlns:p14="http://schemas.microsoft.com/office/powerpoint/2010/main" val="2704561090"/>
       </p:ext>
     </p:extLst>
   </p:cSld>

</xml_diff>